<commit_message>
many files in data file have been moved to other projects, e.g., soil healthcal culator
</commit_message>
<xml_diff>
--- a/outputs/Figure 2-3 SamplingDepth.pptx
+++ b/outputs/Figure 2-3 SamplingDepth.pptx
@@ -5,9 +5,10 @@
     <p:sldMasterId id="2147483648" r:id="rId1"/>
   </p:sldMasterIdLst>
   <p:sldIdLst>
-    <p:sldId id="256" r:id="rId2"/>
-    <p:sldId id="257" r:id="rId3"/>
-    <p:sldId id="258" r:id="rId4"/>
+    <p:sldId id="257" r:id="rId2"/>
+    <p:sldId id="256" r:id="rId3"/>
+    <p:sldId id="259" r:id="rId4"/>
+    <p:sldId id="258" r:id="rId5"/>
   </p:sldIdLst>
   <p:sldSz cx="9144000" cy="6858000" type="screen4x3"/>
   <p:notesSz cx="6858000" cy="9144000"/>
@@ -290,7 +291,7 @@
           <a:p>
             <a:fld id="{530820CF-B880-4189-942D-D702A7CBA730}" type="datetimeFigureOut">
               <a:rPr lang="zh-CN" altLang="en-US" smtClean="0"/>
-              <a:t>2019/9/17</a:t>
+              <a:t>2019/10/4</a:t>
             </a:fld>
             <a:endParaRPr lang="zh-CN" altLang="en-US"/>
           </a:p>
@@ -455,7 +456,7 @@
           <a:p>
             <a:fld id="{530820CF-B880-4189-942D-D702A7CBA730}" type="datetimeFigureOut">
               <a:rPr lang="zh-CN" altLang="en-US" smtClean="0"/>
-              <a:t>2019/9/17</a:t>
+              <a:t>2019/10/4</a:t>
             </a:fld>
             <a:endParaRPr lang="zh-CN" altLang="en-US"/>
           </a:p>
@@ -630,7 +631,7 @@
           <a:p>
             <a:fld id="{530820CF-B880-4189-942D-D702A7CBA730}" type="datetimeFigureOut">
               <a:rPr lang="zh-CN" altLang="en-US" smtClean="0"/>
-              <a:t>2019/9/17</a:t>
+              <a:t>2019/10/4</a:t>
             </a:fld>
             <a:endParaRPr lang="zh-CN" altLang="en-US"/>
           </a:p>
@@ -795,7 +796,7 @@
           <a:p>
             <a:fld id="{530820CF-B880-4189-942D-D702A7CBA730}" type="datetimeFigureOut">
               <a:rPr lang="zh-CN" altLang="en-US" smtClean="0"/>
-              <a:t>2019/9/17</a:t>
+              <a:t>2019/10/4</a:t>
             </a:fld>
             <a:endParaRPr lang="zh-CN" altLang="en-US"/>
           </a:p>
@@ -1036,7 +1037,7 @@
           <a:p>
             <a:fld id="{530820CF-B880-4189-942D-D702A7CBA730}" type="datetimeFigureOut">
               <a:rPr lang="zh-CN" altLang="en-US" smtClean="0"/>
-              <a:t>2019/9/17</a:t>
+              <a:t>2019/10/4</a:t>
             </a:fld>
             <a:endParaRPr lang="zh-CN" altLang="en-US"/>
           </a:p>
@@ -1319,7 +1320,7 @@
           <a:p>
             <a:fld id="{530820CF-B880-4189-942D-D702A7CBA730}" type="datetimeFigureOut">
               <a:rPr lang="zh-CN" altLang="en-US" smtClean="0"/>
-              <a:t>2019/9/17</a:t>
+              <a:t>2019/10/4</a:t>
             </a:fld>
             <a:endParaRPr lang="zh-CN" altLang="en-US"/>
           </a:p>
@@ -1736,7 +1737,7 @@
           <a:p>
             <a:fld id="{530820CF-B880-4189-942D-D702A7CBA730}" type="datetimeFigureOut">
               <a:rPr lang="zh-CN" altLang="en-US" smtClean="0"/>
-              <a:t>2019/9/17</a:t>
+              <a:t>2019/10/4</a:t>
             </a:fld>
             <a:endParaRPr lang="zh-CN" altLang="en-US"/>
           </a:p>
@@ -1849,7 +1850,7 @@
           <a:p>
             <a:fld id="{530820CF-B880-4189-942D-D702A7CBA730}" type="datetimeFigureOut">
               <a:rPr lang="zh-CN" altLang="en-US" smtClean="0"/>
-              <a:t>2019/9/17</a:t>
+              <a:t>2019/10/4</a:t>
             </a:fld>
             <a:endParaRPr lang="zh-CN" altLang="en-US"/>
           </a:p>
@@ -1939,7 +1940,7 @@
           <a:p>
             <a:fld id="{530820CF-B880-4189-942D-D702A7CBA730}" type="datetimeFigureOut">
               <a:rPr lang="zh-CN" altLang="en-US" smtClean="0"/>
-              <a:t>2019/9/17</a:t>
+              <a:t>2019/10/4</a:t>
             </a:fld>
             <a:endParaRPr lang="zh-CN" altLang="en-US"/>
           </a:p>
@@ -2211,7 +2212,7 @@
           <a:p>
             <a:fld id="{530820CF-B880-4189-942D-D702A7CBA730}" type="datetimeFigureOut">
               <a:rPr lang="zh-CN" altLang="en-US" smtClean="0"/>
-              <a:t>2019/9/17</a:t>
+              <a:t>2019/10/4</a:t>
             </a:fld>
             <a:endParaRPr lang="zh-CN" altLang="en-US"/>
           </a:p>
@@ -2459,7 +2460,7 @@
           <a:p>
             <a:fld id="{530820CF-B880-4189-942D-D702A7CBA730}" type="datetimeFigureOut">
               <a:rPr lang="zh-CN" altLang="en-US" smtClean="0"/>
-              <a:t>2019/9/17</a:t>
+              <a:t>2019/10/4</a:t>
             </a:fld>
             <a:endParaRPr lang="zh-CN" altLang="en-US"/>
           </a:p>
@@ -2667,7 +2668,7 @@
           <a:p>
             <a:fld id="{530820CF-B880-4189-942D-D702A7CBA730}" type="datetimeFigureOut">
               <a:rPr lang="zh-CN" altLang="en-US" smtClean="0"/>
-              <a:t>2019/9/17</a:t>
+              <a:t>2019/10/4</a:t>
             </a:fld>
             <a:endParaRPr lang="zh-CN" altLang="en-US"/>
           </a:p>
@@ -3039,6 +3040,2208 @@
       </p:grpSpPr>
       <p:sp>
         <p:nvSpPr>
+          <p:cNvPr id="33" name="矩形 32"/>
+          <p:cNvSpPr/>
+          <p:nvPr/>
+        </p:nvSpPr>
+        <p:spPr>
+          <a:xfrm>
+            <a:off x="1748880" y="913269"/>
+            <a:ext cx="1224136" cy="3163803"/>
+          </a:xfrm>
+          <a:prstGeom prst="rect">
+            <a:avLst/>
+          </a:prstGeom>
+          <a:noFill/>
+          <a:ln w="15875">
+            <a:solidFill>
+              <a:schemeClr val="bg1">
+                <a:lumMod val="85000"/>
+              </a:schemeClr>
+            </a:solidFill>
+          </a:ln>
+        </p:spPr>
+        <p:style>
+          <a:lnRef idx="2">
+            <a:schemeClr val="accent1">
+              <a:shade val="50000"/>
+            </a:schemeClr>
+          </a:lnRef>
+          <a:fillRef idx="1">
+            <a:schemeClr val="accent1"/>
+          </a:fillRef>
+          <a:effectRef idx="0">
+            <a:schemeClr val="accent1"/>
+          </a:effectRef>
+          <a:fontRef idx="minor">
+            <a:schemeClr val="lt1"/>
+          </a:fontRef>
+        </p:style>
+        <p:txBody>
+          <a:bodyPr rtlCol="0" anchor="ctr"/>
+          <a:lstStyle/>
+          <a:p>
+            <a:pPr algn="ctr"/>
+            <a:endParaRPr lang="en-US" sz="900" b="1" dirty="0">
+              <a:solidFill>
+                <a:schemeClr val="tx1"/>
+              </a:solidFill>
+              <a:latin typeface="Times New Roman" panose="02020603050405020304" pitchFamily="18" charset="0"/>
+              <a:cs typeface="Times New Roman" panose="02020603050405020304" pitchFamily="18" charset="0"/>
+            </a:endParaRPr>
+          </a:p>
+        </p:txBody>
+      </p:sp>
+      <p:sp>
+        <p:nvSpPr>
+          <p:cNvPr id="13" name="矩形 12"/>
+          <p:cNvSpPr/>
+          <p:nvPr/>
+        </p:nvSpPr>
+        <p:spPr>
+          <a:xfrm>
+            <a:off x="6468591" y="1052736"/>
+            <a:ext cx="1008112" cy="392155"/>
+          </a:xfrm>
+          <a:prstGeom prst="rect">
+            <a:avLst/>
+          </a:prstGeom>
+          <a:solidFill>
+            <a:schemeClr val="bg1">
+              <a:lumMod val="95000"/>
+            </a:schemeClr>
+          </a:solidFill>
+          <a:ln w="15875">
+            <a:solidFill>
+              <a:schemeClr val="bg1">
+                <a:lumMod val="85000"/>
+              </a:schemeClr>
+            </a:solidFill>
+          </a:ln>
+        </p:spPr>
+        <p:style>
+          <a:lnRef idx="2">
+            <a:schemeClr val="accent1">
+              <a:shade val="50000"/>
+            </a:schemeClr>
+          </a:lnRef>
+          <a:fillRef idx="1">
+            <a:schemeClr val="accent1"/>
+          </a:fillRef>
+          <a:effectRef idx="0">
+            <a:schemeClr val="accent1"/>
+          </a:effectRef>
+          <a:fontRef idx="minor">
+            <a:schemeClr val="lt1"/>
+          </a:fontRef>
+        </p:style>
+        <p:txBody>
+          <a:bodyPr rIns="9144" rtlCol="0" anchor="ctr"/>
+          <a:lstStyle/>
+          <a:p>
+            <a:pPr algn="ctr"/>
+            <a:r>
+              <a:rPr lang="en-US" sz="900" b="1" dirty="0" smtClean="0">
+                <a:solidFill>
+                  <a:schemeClr val="tx1"/>
+                </a:solidFill>
+                <a:latin typeface="Times New Roman" panose="02020603050405020304" pitchFamily="18" charset="0"/>
+                <a:cs typeface="Times New Roman" panose="02020603050405020304" pitchFamily="18" charset="0"/>
+              </a:rPr>
+              <a:t>Systematic review</a:t>
+            </a:r>
+            <a:endParaRPr lang="en-US" sz="900" b="1" dirty="0">
+              <a:solidFill>
+                <a:schemeClr val="tx1"/>
+              </a:solidFill>
+              <a:latin typeface="Times New Roman" panose="02020603050405020304" pitchFamily="18" charset="0"/>
+              <a:cs typeface="Times New Roman" panose="02020603050405020304" pitchFamily="18" charset="0"/>
+            </a:endParaRPr>
+          </a:p>
+        </p:txBody>
+      </p:sp>
+      <p:sp>
+        <p:nvSpPr>
+          <p:cNvPr id="14" name="矩形 13"/>
+          <p:cNvSpPr/>
+          <p:nvPr/>
+        </p:nvSpPr>
+        <p:spPr>
+          <a:xfrm>
+            <a:off x="6468591" y="1556792"/>
+            <a:ext cx="1008112" cy="392155"/>
+          </a:xfrm>
+          <a:prstGeom prst="rect">
+            <a:avLst/>
+          </a:prstGeom>
+          <a:solidFill>
+            <a:schemeClr val="bg1">
+              <a:lumMod val="95000"/>
+            </a:schemeClr>
+          </a:solidFill>
+          <a:ln w="15875">
+            <a:solidFill>
+              <a:schemeClr val="bg1">
+                <a:lumMod val="85000"/>
+              </a:schemeClr>
+            </a:solidFill>
+          </a:ln>
+        </p:spPr>
+        <p:style>
+          <a:lnRef idx="2">
+            <a:schemeClr val="accent1">
+              <a:shade val="50000"/>
+            </a:schemeClr>
+          </a:lnRef>
+          <a:fillRef idx="1">
+            <a:schemeClr val="accent1"/>
+          </a:fillRef>
+          <a:effectRef idx="0">
+            <a:schemeClr val="accent1"/>
+          </a:effectRef>
+          <a:fontRef idx="minor">
+            <a:schemeClr val="lt1"/>
+          </a:fontRef>
+        </p:style>
+        <p:txBody>
+          <a:bodyPr rIns="9144" rtlCol="0" anchor="ctr"/>
+          <a:lstStyle/>
+          <a:p>
+            <a:pPr algn="ctr"/>
+            <a:r>
+              <a:rPr lang="en-US" sz="900" b="1" dirty="0" smtClean="0">
+                <a:solidFill>
+                  <a:schemeClr val="tx1"/>
+                </a:solidFill>
+                <a:latin typeface="Times New Roman" panose="02020603050405020304" pitchFamily="18" charset="0"/>
+                <a:cs typeface="Times New Roman" panose="02020603050405020304" pitchFamily="18" charset="0"/>
+              </a:rPr>
+              <a:t>Meta-analysis</a:t>
+            </a:r>
+            <a:endParaRPr lang="en-US" sz="900" b="1" dirty="0">
+              <a:solidFill>
+                <a:schemeClr val="tx1"/>
+              </a:solidFill>
+              <a:latin typeface="Times New Roman" panose="02020603050405020304" pitchFamily="18" charset="0"/>
+              <a:cs typeface="Times New Roman" panose="02020603050405020304" pitchFamily="18" charset="0"/>
+            </a:endParaRPr>
+          </a:p>
+        </p:txBody>
+      </p:sp>
+      <p:sp>
+        <p:nvSpPr>
+          <p:cNvPr id="15" name="矩形 14"/>
+          <p:cNvSpPr/>
+          <p:nvPr/>
+        </p:nvSpPr>
+        <p:spPr>
+          <a:xfrm>
+            <a:off x="6468591" y="2060848"/>
+            <a:ext cx="1008112" cy="392155"/>
+          </a:xfrm>
+          <a:prstGeom prst="rect">
+            <a:avLst/>
+          </a:prstGeom>
+          <a:solidFill>
+            <a:schemeClr val="bg1">
+              <a:lumMod val="95000"/>
+            </a:schemeClr>
+          </a:solidFill>
+          <a:ln w="15875">
+            <a:solidFill>
+              <a:schemeClr val="bg1">
+                <a:lumMod val="85000"/>
+              </a:schemeClr>
+            </a:solidFill>
+          </a:ln>
+        </p:spPr>
+        <p:style>
+          <a:lnRef idx="2">
+            <a:schemeClr val="accent1">
+              <a:shade val="50000"/>
+            </a:schemeClr>
+          </a:lnRef>
+          <a:fillRef idx="1">
+            <a:schemeClr val="accent1"/>
+          </a:fillRef>
+          <a:effectRef idx="0">
+            <a:schemeClr val="accent1"/>
+          </a:effectRef>
+          <a:fontRef idx="minor">
+            <a:schemeClr val="lt1"/>
+          </a:fontRef>
+        </p:style>
+        <p:txBody>
+          <a:bodyPr rIns="9144" rtlCol="0" anchor="ctr"/>
+          <a:lstStyle/>
+          <a:p>
+            <a:pPr algn="ctr"/>
+            <a:r>
+              <a:rPr lang="en-US" sz="900" b="1" dirty="0" smtClean="0">
+                <a:solidFill>
+                  <a:schemeClr val="tx1"/>
+                </a:solidFill>
+                <a:latin typeface="Times New Roman" panose="02020603050405020304" pitchFamily="18" charset="0"/>
+                <a:cs typeface="Times New Roman" panose="02020603050405020304" pitchFamily="18" charset="0"/>
+              </a:rPr>
+              <a:t>Soil health calculator</a:t>
+            </a:r>
+            <a:endParaRPr lang="en-US" sz="900" b="1" dirty="0">
+              <a:solidFill>
+                <a:schemeClr val="tx1"/>
+              </a:solidFill>
+              <a:latin typeface="Times New Roman" panose="02020603050405020304" pitchFamily="18" charset="0"/>
+              <a:cs typeface="Times New Roman" panose="02020603050405020304" pitchFamily="18" charset="0"/>
+            </a:endParaRPr>
+          </a:p>
+        </p:txBody>
+      </p:sp>
+      <p:sp>
+        <p:nvSpPr>
+          <p:cNvPr id="16" name="矩形 15"/>
+          <p:cNvSpPr/>
+          <p:nvPr/>
+        </p:nvSpPr>
+        <p:spPr>
+          <a:xfrm>
+            <a:off x="6467847" y="2564904"/>
+            <a:ext cx="1008112" cy="392155"/>
+          </a:xfrm>
+          <a:prstGeom prst="rect">
+            <a:avLst/>
+          </a:prstGeom>
+          <a:solidFill>
+            <a:schemeClr val="bg1">
+              <a:lumMod val="95000"/>
+            </a:schemeClr>
+          </a:solidFill>
+          <a:ln w="15875">
+            <a:solidFill>
+              <a:schemeClr val="bg1">
+                <a:lumMod val="85000"/>
+              </a:schemeClr>
+            </a:solidFill>
+          </a:ln>
+        </p:spPr>
+        <p:style>
+          <a:lnRef idx="2">
+            <a:schemeClr val="accent1">
+              <a:shade val="50000"/>
+            </a:schemeClr>
+          </a:lnRef>
+          <a:fillRef idx="1">
+            <a:schemeClr val="accent1"/>
+          </a:fillRef>
+          <a:effectRef idx="0">
+            <a:schemeClr val="accent1"/>
+          </a:effectRef>
+          <a:fontRef idx="minor">
+            <a:schemeClr val="lt1"/>
+          </a:fontRef>
+        </p:style>
+        <p:txBody>
+          <a:bodyPr rIns="9144" rtlCol="0" anchor="ctr"/>
+          <a:lstStyle/>
+          <a:p>
+            <a:pPr algn="ctr"/>
+            <a:r>
+              <a:rPr lang="en-US" sz="900" b="1" dirty="0" smtClean="0">
+                <a:solidFill>
+                  <a:schemeClr val="tx1"/>
+                </a:solidFill>
+                <a:latin typeface="Times New Roman" panose="02020603050405020304" pitchFamily="18" charset="0"/>
+                <a:cs typeface="Times New Roman" panose="02020603050405020304" pitchFamily="18" charset="0"/>
+              </a:rPr>
+              <a:t>Experiment protocol</a:t>
+            </a:r>
+            <a:endParaRPr lang="en-US" sz="900" b="1" dirty="0">
+              <a:solidFill>
+                <a:schemeClr val="tx1"/>
+              </a:solidFill>
+              <a:latin typeface="Times New Roman" panose="02020603050405020304" pitchFamily="18" charset="0"/>
+              <a:cs typeface="Times New Roman" panose="02020603050405020304" pitchFamily="18" charset="0"/>
+            </a:endParaRPr>
+          </a:p>
+        </p:txBody>
+      </p:sp>
+      <p:sp>
+        <p:nvSpPr>
+          <p:cNvPr id="17" name="矩形 16"/>
+          <p:cNvSpPr/>
+          <p:nvPr/>
+        </p:nvSpPr>
+        <p:spPr>
+          <a:xfrm>
+            <a:off x="6372200" y="913269"/>
+            <a:ext cx="1224136" cy="3163803"/>
+          </a:xfrm>
+          <a:prstGeom prst="rect">
+            <a:avLst/>
+          </a:prstGeom>
+          <a:noFill/>
+          <a:ln w="15875">
+            <a:solidFill>
+              <a:schemeClr val="bg1">
+                <a:lumMod val="85000"/>
+              </a:schemeClr>
+            </a:solidFill>
+          </a:ln>
+        </p:spPr>
+        <p:style>
+          <a:lnRef idx="2">
+            <a:schemeClr val="accent1">
+              <a:shade val="50000"/>
+            </a:schemeClr>
+          </a:lnRef>
+          <a:fillRef idx="1">
+            <a:schemeClr val="accent1"/>
+          </a:fillRef>
+          <a:effectRef idx="0">
+            <a:schemeClr val="accent1"/>
+          </a:effectRef>
+          <a:fontRef idx="minor">
+            <a:schemeClr val="lt1"/>
+          </a:fontRef>
+        </p:style>
+        <p:txBody>
+          <a:bodyPr rtlCol="0" anchor="ctr"/>
+          <a:lstStyle/>
+          <a:p>
+            <a:pPr algn="ctr"/>
+            <a:endParaRPr lang="en-US" sz="900" b="1" dirty="0">
+              <a:solidFill>
+                <a:schemeClr val="tx1"/>
+              </a:solidFill>
+              <a:latin typeface="Times New Roman" panose="02020603050405020304" pitchFamily="18" charset="0"/>
+              <a:cs typeface="Times New Roman" panose="02020603050405020304" pitchFamily="18" charset="0"/>
+            </a:endParaRPr>
+          </a:p>
+        </p:txBody>
+      </p:sp>
+      <p:sp>
+        <p:nvSpPr>
+          <p:cNvPr id="27" name="矩形 26"/>
+          <p:cNvSpPr/>
+          <p:nvPr/>
+        </p:nvSpPr>
+        <p:spPr>
+          <a:xfrm>
+            <a:off x="1835696" y="1100279"/>
+            <a:ext cx="1008112" cy="392155"/>
+          </a:xfrm>
+          <a:prstGeom prst="rect">
+            <a:avLst/>
+          </a:prstGeom>
+          <a:solidFill>
+            <a:schemeClr val="bg1">
+              <a:lumMod val="95000"/>
+            </a:schemeClr>
+          </a:solidFill>
+          <a:ln w="15875">
+            <a:solidFill>
+              <a:schemeClr val="bg1">
+                <a:lumMod val="85000"/>
+              </a:schemeClr>
+            </a:solidFill>
+          </a:ln>
+        </p:spPr>
+        <p:style>
+          <a:lnRef idx="2">
+            <a:schemeClr val="accent1">
+              <a:shade val="50000"/>
+            </a:schemeClr>
+          </a:lnRef>
+          <a:fillRef idx="1">
+            <a:schemeClr val="accent1"/>
+          </a:fillRef>
+          <a:effectRef idx="0">
+            <a:schemeClr val="accent1"/>
+          </a:effectRef>
+          <a:fontRef idx="minor">
+            <a:schemeClr val="lt1"/>
+          </a:fontRef>
+        </p:style>
+        <p:txBody>
+          <a:bodyPr lIns="9144" rIns="9144" rtlCol="0" anchor="ctr"/>
+          <a:lstStyle/>
+          <a:p>
+            <a:pPr algn="ctr"/>
+            <a:r>
+              <a:rPr lang="en-US" sz="900" b="1" dirty="0" smtClean="0">
+                <a:solidFill>
+                  <a:schemeClr val="tx1"/>
+                </a:solidFill>
+                <a:latin typeface="Times New Roman" panose="02020603050405020304" pitchFamily="18" charset="0"/>
+                <a:cs typeface="Times New Roman" panose="02020603050405020304" pitchFamily="18" charset="0"/>
+              </a:rPr>
+              <a:t>Paper collection and selection</a:t>
+            </a:r>
+            <a:endParaRPr lang="en-US" sz="900" b="1" dirty="0">
+              <a:solidFill>
+                <a:schemeClr val="tx1"/>
+              </a:solidFill>
+              <a:latin typeface="Times New Roman" panose="02020603050405020304" pitchFamily="18" charset="0"/>
+              <a:cs typeface="Times New Roman" panose="02020603050405020304" pitchFamily="18" charset="0"/>
+            </a:endParaRPr>
+          </a:p>
+        </p:txBody>
+      </p:sp>
+      <p:sp>
+        <p:nvSpPr>
+          <p:cNvPr id="28" name="矩形 27"/>
+          <p:cNvSpPr/>
+          <p:nvPr/>
+        </p:nvSpPr>
+        <p:spPr>
+          <a:xfrm>
+            <a:off x="1835696" y="2708920"/>
+            <a:ext cx="1008112" cy="392155"/>
+          </a:xfrm>
+          <a:prstGeom prst="rect">
+            <a:avLst/>
+          </a:prstGeom>
+          <a:solidFill>
+            <a:schemeClr val="bg1">
+              <a:lumMod val="95000"/>
+            </a:schemeClr>
+          </a:solidFill>
+          <a:ln w="15875">
+            <a:solidFill>
+              <a:schemeClr val="bg1">
+                <a:lumMod val="85000"/>
+              </a:schemeClr>
+            </a:solidFill>
+          </a:ln>
+        </p:spPr>
+        <p:style>
+          <a:lnRef idx="2">
+            <a:schemeClr val="accent1">
+              <a:shade val="50000"/>
+            </a:schemeClr>
+          </a:lnRef>
+          <a:fillRef idx="1">
+            <a:schemeClr val="accent1"/>
+          </a:fillRef>
+          <a:effectRef idx="0">
+            <a:schemeClr val="accent1"/>
+          </a:effectRef>
+          <a:fontRef idx="minor">
+            <a:schemeClr val="lt1"/>
+          </a:fontRef>
+        </p:style>
+        <p:txBody>
+          <a:bodyPr rIns="9144" rtlCol="0" anchor="ctr"/>
+          <a:lstStyle/>
+          <a:p>
+            <a:pPr algn="ctr"/>
+            <a:r>
+              <a:rPr lang="en-US" sz="900" b="1" dirty="0" smtClean="0">
+                <a:solidFill>
+                  <a:schemeClr val="tx1"/>
+                </a:solidFill>
+                <a:latin typeface="Times New Roman" panose="02020603050405020304" pitchFamily="18" charset="0"/>
+                <a:cs typeface="Times New Roman" panose="02020603050405020304" pitchFamily="18" charset="0"/>
+              </a:rPr>
+              <a:t>Quality control</a:t>
+            </a:r>
+            <a:endParaRPr lang="en-US" sz="900" b="1" dirty="0">
+              <a:solidFill>
+                <a:schemeClr val="tx1"/>
+              </a:solidFill>
+              <a:latin typeface="Times New Roman" panose="02020603050405020304" pitchFamily="18" charset="0"/>
+              <a:cs typeface="Times New Roman" panose="02020603050405020304" pitchFamily="18" charset="0"/>
+            </a:endParaRPr>
+          </a:p>
+        </p:txBody>
+      </p:sp>
+      <p:sp>
+        <p:nvSpPr>
+          <p:cNvPr id="34" name="矩形 33"/>
+          <p:cNvSpPr/>
+          <p:nvPr/>
+        </p:nvSpPr>
+        <p:spPr>
+          <a:xfrm>
+            <a:off x="1835696" y="1884717"/>
+            <a:ext cx="1008112" cy="392155"/>
+          </a:xfrm>
+          <a:prstGeom prst="rect">
+            <a:avLst/>
+          </a:prstGeom>
+          <a:solidFill>
+            <a:schemeClr val="bg1">
+              <a:lumMod val="95000"/>
+            </a:schemeClr>
+          </a:solidFill>
+          <a:ln w="15875">
+            <a:solidFill>
+              <a:schemeClr val="bg1">
+                <a:lumMod val="85000"/>
+              </a:schemeClr>
+            </a:solidFill>
+          </a:ln>
+        </p:spPr>
+        <p:style>
+          <a:lnRef idx="2">
+            <a:schemeClr val="accent1">
+              <a:shade val="50000"/>
+            </a:schemeClr>
+          </a:lnRef>
+          <a:fillRef idx="1">
+            <a:schemeClr val="accent1"/>
+          </a:fillRef>
+          <a:effectRef idx="0">
+            <a:schemeClr val="accent1"/>
+          </a:effectRef>
+          <a:fontRef idx="minor">
+            <a:schemeClr val="lt1"/>
+          </a:fontRef>
+        </p:style>
+        <p:txBody>
+          <a:bodyPr rIns="9144" rtlCol="0" anchor="ctr"/>
+          <a:lstStyle/>
+          <a:p>
+            <a:pPr algn="ctr"/>
+            <a:r>
+              <a:rPr lang="en-US" sz="900" b="1" dirty="0" smtClean="0">
+                <a:solidFill>
+                  <a:schemeClr val="tx1"/>
+                </a:solidFill>
+                <a:latin typeface="Times New Roman" panose="02020603050405020304" pitchFamily="18" charset="0"/>
+                <a:cs typeface="Times New Roman" panose="02020603050405020304" pitchFamily="18" charset="0"/>
+              </a:rPr>
+              <a:t>Data extraction and integration</a:t>
+            </a:r>
+            <a:endParaRPr lang="en-US" sz="900" b="1" dirty="0">
+              <a:solidFill>
+                <a:schemeClr val="tx1"/>
+              </a:solidFill>
+              <a:latin typeface="Times New Roman" panose="02020603050405020304" pitchFamily="18" charset="0"/>
+              <a:cs typeface="Times New Roman" panose="02020603050405020304" pitchFamily="18" charset="0"/>
+            </a:endParaRPr>
+          </a:p>
+        </p:txBody>
+      </p:sp>
+      <p:sp>
+        <p:nvSpPr>
+          <p:cNvPr id="35" name="矩形 34"/>
+          <p:cNvSpPr/>
+          <p:nvPr/>
+        </p:nvSpPr>
+        <p:spPr>
+          <a:xfrm>
+            <a:off x="1834129" y="3501008"/>
+            <a:ext cx="1008112" cy="392155"/>
+          </a:xfrm>
+          <a:prstGeom prst="rect">
+            <a:avLst/>
+          </a:prstGeom>
+          <a:solidFill>
+            <a:schemeClr val="bg1">
+              <a:lumMod val="95000"/>
+            </a:schemeClr>
+          </a:solidFill>
+          <a:ln w="15875">
+            <a:solidFill>
+              <a:schemeClr val="bg1">
+                <a:lumMod val="85000"/>
+              </a:schemeClr>
+            </a:solidFill>
+          </a:ln>
+        </p:spPr>
+        <p:style>
+          <a:lnRef idx="2">
+            <a:schemeClr val="accent1">
+              <a:shade val="50000"/>
+            </a:schemeClr>
+          </a:lnRef>
+          <a:fillRef idx="1">
+            <a:schemeClr val="accent1"/>
+          </a:fillRef>
+          <a:effectRef idx="0">
+            <a:schemeClr val="accent1"/>
+          </a:effectRef>
+          <a:fontRef idx="minor">
+            <a:schemeClr val="lt1"/>
+          </a:fontRef>
+        </p:style>
+        <p:txBody>
+          <a:bodyPr rIns="9144" rtlCol="0" anchor="ctr"/>
+          <a:lstStyle/>
+          <a:p>
+            <a:pPr algn="ctr"/>
+            <a:r>
+              <a:rPr lang="en-US" sz="900" b="1" dirty="0" smtClean="0">
+                <a:solidFill>
+                  <a:schemeClr val="tx1"/>
+                </a:solidFill>
+                <a:latin typeface="Times New Roman" panose="02020603050405020304" pitchFamily="18" charset="0"/>
+                <a:cs typeface="Times New Roman" panose="02020603050405020304" pitchFamily="18" charset="0"/>
+              </a:rPr>
+              <a:t>Data processing</a:t>
+            </a:r>
+            <a:endParaRPr lang="en-US" sz="900" b="1" dirty="0">
+              <a:solidFill>
+                <a:schemeClr val="tx1"/>
+              </a:solidFill>
+              <a:latin typeface="Times New Roman" panose="02020603050405020304" pitchFamily="18" charset="0"/>
+              <a:cs typeface="Times New Roman" panose="02020603050405020304" pitchFamily="18" charset="0"/>
+            </a:endParaRPr>
+          </a:p>
+        </p:txBody>
+      </p:sp>
+      <p:cxnSp>
+        <p:nvCxnSpPr>
+          <p:cNvPr id="41" name="直接箭头连接符 40"/>
+          <p:cNvCxnSpPr>
+            <a:stCxn id="34" idx="2"/>
+            <a:endCxn id="28" idx="0"/>
+          </p:cNvCxnSpPr>
+          <p:nvPr/>
+        </p:nvCxnSpPr>
+        <p:spPr>
+          <a:xfrm>
+            <a:off x="2339752" y="2276872"/>
+            <a:ext cx="0" cy="432048"/>
+          </a:xfrm>
+          <a:prstGeom prst="straightConnector1">
+            <a:avLst/>
+          </a:prstGeom>
+          <a:ln w="15875">
+            <a:solidFill>
+              <a:schemeClr val="bg1">
+                <a:lumMod val="75000"/>
+              </a:schemeClr>
+            </a:solidFill>
+            <a:tailEnd type="arrow"/>
+          </a:ln>
+        </p:spPr>
+        <p:style>
+          <a:lnRef idx="1">
+            <a:schemeClr val="accent1"/>
+          </a:lnRef>
+          <a:fillRef idx="0">
+            <a:schemeClr val="accent1"/>
+          </a:fillRef>
+          <a:effectRef idx="0">
+            <a:schemeClr val="accent1"/>
+          </a:effectRef>
+          <a:fontRef idx="minor">
+            <a:schemeClr val="tx1"/>
+          </a:fontRef>
+        </p:style>
+      </p:cxnSp>
+      <p:cxnSp>
+        <p:nvCxnSpPr>
+          <p:cNvPr id="42" name="直接箭头连接符 41"/>
+          <p:cNvCxnSpPr>
+            <a:stCxn id="27" idx="2"/>
+            <a:endCxn id="34" idx="0"/>
+          </p:cNvCxnSpPr>
+          <p:nvPr/>
+        </p:nvCxnSpPr>
+        <p:spPr>
+          <a:xfrm>
+            <a:off x="2339752" y="1492434"/>
+            <a:ext cx="0" cy="392283"/>
+          </a:xfrm>
+          <a:prstGeom prst="straightConnector1">
+            <a:avLst/>
+          </a:prstGeom>
+          <a:ln w="15875">
+            <a:solidFill>
+              <a:schemeClr val="bg1">
+                <a:lumMod val="75000"/>
+              </a:schemeClr>
+            </a:solidFill>
+            <a:tailEnd type="arrow"/>
+          </a:ln>
+        </p:spPr>
+        <p:style>
+          <a:lnRef idx="1">
+            <a:schemeClr val="accent1"/>
+          </a:lnRef>
+          <a:fillRef idx="0">
+            <a:schemeClr val="accent1"/>
+          </a:fillRef>
+          <a:effectRef idx="0">
+            <a:schemeClr val="accent1"/>
+          </a:effectRef>
+          <a:fontRef idx="minor">
+            <a:schemeClr val="tx1"/>
+          </a:fontRef>
+        </p:style>
+      </p:cxnSp>
+      <p:cxnSp>
+        <p:nvCxnSpPr>
+          <p:cNvPr id="43" name="直接箭头连接符 42"/>
+          <p:cNvCxnSpPr>
+            <a:stCxn id="28" idx="2"/>
+            <a:endCxn id="35" idx="0"/>
+          </p:cNvCxnSpPr>
+          <p:nvPr/>
+        </p:nvCxnSpPr>
+        <p:spPr>
+          <a:xfrm flipH="1">
+            <a:off x="2338185" y="3101075"/>
+            <a:ext cx="1567" cy="399933"/>
+          </a:xfrm>
+          <a:prstGeom prst="straightConnector1">
+            <a:avLst/>
+          </a:prstGeom>
+          <a:ln w="15875">
+            <a:solidFill>
+              <a:schemeClr val="bg1">
+                <a:lumMod val="75000"/>
+              </a:schemeClr>
+            </a:solidFill>
+            <a:tailEnd type="arrow"/>
+          </a:ln>
+        </p:spPr>
+        <p:style>
+          <a:lnRef idx="1">
+            <a:schemeClr val="accent1"/>
+          </a:lnRef>
+          <a:fillRef idx="0">
+            <a:schemeClr val="accent1"/>
+          </a:fillRef>
+          <a:effectRef idx="0">
+            <a:schemeClr val="accent1"/>
+          </a:effectRef>
+          <a:fontRef idx="minor">
+            <a:schemeClr val="tx1"/>
+          </a:fontRef>
+        </p:style>
+      </p:cxnSp>
+      <p:sp>
+        <p:nvSpPr>
+          <p:cNvPr id="19" name="矩形 18"/>
+          <p:cNvSpPr/>
+          <p:nvPr/>
+        </p:nvSpPr>
+        <p:spPr>
+          <a:xfrm>
+            <a:off x="3518733" y="1124744"/>
+            <a:ext cx="909251" cy="367690"/>
+          </a:xfrm>
+          <a:prstGeom prst="rect">
+            <a:avLst/>
+          </a:prstGeom>
+          <a:solidFill>
+            <a:schemeClr val="bg1">
+              <a:lumMod val="95000"/>
+            </a:schemeClr>
+          </a:solidFill>
+          <a:ln w="15875">
+            <a:solidFill>
+              <a:schemeClr val="bg1">
+                <a:lumMod val="85000"/>
+              </a:schemeClr>
+            </a:solidFill>
+          </a:ln>
+        </p:spPr>
+        <p:style>
+          <a:lnRef idx="2">
+            <a:schemeClr val="accent1">
+              <a:shade val="50000"/>
+            </a:schemeClr>
+          </a:lnRef>
+          <a:fillRef idx="1">
+            <a:schemeClr val="accent1"/>
+          </a:fillRef>
+          <a:effectRef idx="0">
+            <a:schemeClr val="accent1"/>
+          </a:effectRef>
+          <a:fontRef idx="minor">
+            <a:schemeClr val="lt1"/>
+          </a:fontRef>
+        </p:style>
+        <p:txBody>
+          <a:bodyPr rIns="9144" rtlCol="0" anchor="ctr"/>
+          <a:lstStyle/>
+          <a:p>
+            <a:pPr algn="ctr"/>
+            <a:r>
+              <a:rPr lang="en-US" sz="900" b="1" dirty="0" smtClean="0">
+                <a:solidFill>
+                  <a:schemeClr val="tx1"/>
+                </a:solidFill>
+                <a:latin typeface="Times New Roman" panose="02020603050405020304" pitchFamily="18" charset="0"/>
+                <a:cs typeface="Times New Roman" panose="02020603050405020304" pitchFamily="18" charset="0"/>
+              </a:rPr>
+              <a:t>Same experiment ID</a:t>
+            </a:r>
+            <a:endParaRPr lang="en-US" sz="900" b="1" dirty="0">
+              <a:solidFill>
+                <a:schemeClr val="tx1"/>
+              </a:solidFill>
+              <a:latin typeface="Times New Roman" panose="02020603050405020304" pitchFamily="18" charset="0"/>
+              <a:cs typeface="Times New Roman" panose="02020603050405020304" pitchFamily="18" charset="0"/>
+            </a:endParaRPr>
+          </a:p>
+        </p:txBody>
+      </p:sp>
+      <p:grpSp>
+        <p:nvGrpSpPr>
+          <p:cNvPr id="82" name="组合 81"/>
+          <p:cNvGrpSpPr/>
+          <p:nvPr/>
+        </p:nvGrpSpPr>
+        <p:grpSpPr>
+          <a:xfrm>
+            <a:off x="3671611" y="1700808"/>
+            <a:ext cx="1858780" cy="1765093"/>
+            <a:chOff x="3878773" y="2094756"/>
+            <a:chExt cx="1440160" cy="1440160"/>
+          </a:xfrm>
+        </p:grpSpPr>
+        <p:sp>
+          <p:nvSpPr>
+            <p:cNvPr id="20" name="椭圆 19"/>
+            <p:cNvSpPr/>
+            <p:nvPr/>
+          </p:nvSpPr>
+          <p:spPr>
+            <a:xfrm>
+              <a:off x="3878773" y="2094756"/>
+              <a:ext cx="1440160" cy="1440160"/>
+            </a:xfrm>
+            <a:prstGeom prst="ellipse">
+              <a:avLst/>
+            </a:prstGeom>
+            <a:solidFill>
+              <a:schemeClr val="bg1">
+                <a:lumMod val="95000"/>
+              </a:schemeClr>
+            </a:solidFill>
+            <a:ln w="15875">
+              <a:solidFill>
+                <a:schemeClr val="bg1">
+                  <a:lumMod val="85000"/>
+                </a:schemeClr>
+              </a:solidFill>
+            </a:ln>
+          </p:spPr>
+          <p:style>
+            <a:lnRef idx="2">
+              <a:schemeClr val="accent1">
+                <a:shade val="50000"/>
+              </a:schemeClr>
+            </a:lnRef>
+            <a:fillRef idx="1">
+              <a:schemeClr val="accent1"/>
+            </a:fillRef>
+            <a:effectRef idx="0">
+              <a:schemeClr val="accent1"/>
+            </a:effectRef>
+            <a:fontRef idx="minor">
+              <a:schemeClr val="lt1"/>
+            </a:fontRef>
+          </p:style>
+          <p:txBody>
+            <a:bodyPr lIns="0" rIns="0" rtlCol="0" anchor="ctr"/>
+            <a:lstStyle/>
+            <a:p>
+              <a:pPr algn="ctr"/>
+              <a:endParaRPr lang="en-US" sz="800">
+                <a:latin typeface="Times New Roman" panose="02020603050405020304" pitchFamily="18" charset="0"/>
+                <a:cs typeface="Times New Roman" panose="02020603050405020304" pitchFamily="18" charset="0"/>
+              </a:endParaRPr>
+            </a:p>
+          </p:txBody>
+        </p:sp>
+        <p:sp>
+          <p:nvSpPr>
+            <p:cNvPr id="22" name="圆角矩形 21"/>
+            <p:cNvSpPr/>
+            <p:nvPr/>
+          </p:nvSpPr>
+          <p:spPr>
+            <a:xfrm>
+              <a:off x="4322261" y="2238772"/>
+              <a:ext cx="557376" cy="166019"/>
+            </a:xfrm>
+            <a:prstGeom prst="roundRect">
+              <a:avLst/>
+            </a:prstGeom>
+            <a:solidFill>
+              <a:schemeClr val="bg1">
+                <a:lumMod val="85000"/>
+              </a:schemeClr>
+            </a:solidFill>
+            <a:ln w="15875">
+              <a:solidFill>
+                <a:schemeClr val="tx1">
+                  <a:lumMod val="50000"/>
+                  <a:lumOff val="50000"/>
+                </a:schemeClr>
+              </a:solidFill>
+            </a:ln>
+          </p:spPr>
+          <p:style>
+            <a:lnRef idx="2">
+              <a:schemeClr val="accent1">
+                <a:shade val="50000"/>
+              </a:schemeClr>
+            </a:lnRef>
+            <a:fillRef idx="1">
+              <a:schemeClr val="accent1"/>
+            </a:fillRef>
+            <a:effectRef idx="0">
+              <a:schemeClr val="accent1"/>
+            </a:effectRef>
+            <a:fontRef idx="minor">
+              <a:schemeClr val="lt1"/>
+            </a:fontRef>
+          </p:style>
+          <p:txBody>
+            <a:bodyPr lIns="0" tIns="9144" rIns="0" bIns="9144" rtlCol="0" anchor="ctr"/>
+            <a:lstStyle/>
+            <a:p>
+              <a:pPr algn="ctr"/>
+              <a:r>
+                <a:rPr lang="en-US" sz="800" b="1" dirty="0" smtClean="0">
+                  <a:solidFill>
+                    <a:schemeClr val="tx1"/>
+                  </a:solidFill>
+                  <a:latin typeface="Times New Roman" panose="02020603050405020304" pitchFamily="18" charset="0"/>
+                  <a:cs typeface="Times New Roman" panose="02020603050405020304" pitchFamily="18" charset="0"/>
+                </a:rPr>
+                <a:t>Cover crop</a:t>
+              </a:r>
+              <a:endParaRPr lang="en-US" sz="800" b="1" dirty="0">
+                <a:solidFill>
+                  <a:schemeClr val="tx1"/>
+                </a:solidFill>
+                <a:latin typeface="Times New Roman" panose="02020603050405020304" pitchFamily="18" charset="0"/>
+                <a:cs typeface="Times New Roman" panose="02020603050405020304" pitchFamily="18" charset="0"/>
+              </a:endParaRPr>
+            </a:p>
+          </p:txBody>
+        </p:sp>
+        <p:sp>
+          <p:nvSpPr>
+            <p:cNvPr id="23" name="圆角矩形 22"/>
+            <p:cNvSpPr/>
+            <p:nvPr/>
+          </p:nvSpPr>
+          <p:spPr>
+            <a:xfrm>
+              <a:off x="4022789" y="2485276"/>
+              <a:ext cx="216024" cy="144016"/>
+            </a:xfrm>
+            <a:prstGeom prst="roundRect">
+              <a:avLst/>
+            </a:prstGeom>
+            <a:solidFill>
+              <a:schemeClr val="bg1">
+                <a:lumMod val="85000"/>
+              </a:schemeClr>
+            </a:solidFill>
+            <a:ln w="15875">
+              <a:solidFill>
+                <a:schemeClr val="tx1">
+                  <a:lumMod val="50000"/>
+                  <a:lumOff val="50000"/>
+                </a:schemeClr>
+              </a:solidFill>
+            </a:ln>
+          </p:spPr>
+          <p:style>
+            <a:lnRef idx="2">
+              <a:schemeClr val="accent1">
+                <a:shade val="50000"/>
+              </a:schemeClr>
+            </a:lnRef>
+            <a:fillRef idx="1">
+              <a:schemeClr val="accent1"/>
+            </a:fillRef>
+            <a:effectRef idx="0">
+              <a:schemeClr val="accent1"/>
+            </a:effectRef>
+            <a:fontRef idx="minor">
+              <a:schemeClr val="lt1"/>
+            </a:fontRef>
+          </p:style>
+          <p:txBody>
+            <a:bodyPr lIns="0" tIns="9144" rIns="0" bIns="9144" rtlCol="0" anchor="ctr"/>
+            <a:lstStyle/>
+            <a:p>
+              <a:pPr algn="ctr"/>
+              <a:r>
+                <a:rPr lang="en-US" sz="800" b="1" dirty="0" smtClean="0">
+                  <a:solidFill>
+                    <a:schemeClr val="tx1"/>
+                  </a:solidFill>
+                  <a:latin typeface="Times New Roman" panose="02020603050405020304" pitchFamily="18" charset="0"/>
+                  <a:cs typeface="Times New Roman" panose="02020603050405020304" pitchFamily="18" charset="0"/>
+                </a:rPr>
+                <a:t>Site</a:t>
+              </a:r>
+              <a:endParaRPr lang="en-US" sz="800" b="1" dirty="0">
+                <a:solidFill>
+                  <a:schemeClr val="tx1"/>
+                </a:solidFill>
+                <a:latin typeface="Times New Roman" panose="02020603050405020304" pitchFamily="18" charset="0"/>
+                <a:cs typeface="Times New Roman" panose="02020603050405020304" pitchFamily="18" charset="0"/>
+              </a:endParaRPr>
+            </a:p>
+          </p:txBody>
+        </p:sp>
+        <p:sp>
+          <p:nvSpPr>
+            <p:cNvPr id="24" name="圆角矩形 23"/>
+            <p:cNvSpPr/>
+            <p:nvPr/>
+          </p:nvSpPr>
+          <p:spPr>
+            <a:xfrm>
+              <a:off x="4310821" y="2492916"/>
+              <a:ext cx="360040" cy="136376"/>
+            </a:xfrm>
+            <a:prstGeom prst="roundRect">
+              <a:avLst/>
+            </a:prstGeom>
+            <a:solidFill>
+              <a:schemeClr val="bg1">
+                <a:lumMod val="85000"/>
+              </a:schemeClr>
+            </a:solidFill>
+            <a:ln w="15875">
+              <a:solidFill>
+                <a:schemeClr val="tx1">
+                  <a:lumMod val="50000"/>
+                  <a:lumOff val="50000"/>
+                </a:schemeClr>
+              </a:solidFill>
+            </a:ln>
+          </p:spPr>
+          <p:style>
+            <a:lnRef idx="2">
+              <a:schemeClr val="accent1">
+                <a:shade val="50000"/>
+              </a:schemeClr>
+            </a:lnRef>
+            <a:fillRef idx="1">
+              <a:schemeClr val="accent1"/>
+            </a:fillRef>
+            <a:effectRef idx="0">
+              <a:schemeClr val="accent1"/>
+            </a:effectRef>
+            <a:fontRef idx="minor">
+              <a:schemeClr val="lt1"/>
+            </a:fontRef>
+          </p:style>
+          <p:txBody>
+            <a:bodyPr lIns="0" tIns="9144" rIns="0" bIns="9144" rtlCol="0" anchor="ctr"/>
+            <a:lstStyle/>
+            <a:p>
+              <a:pPr algn="ctr"/>
+              <a:r>
+                <a:rPr lang="en-US" sz="800" b="1" dirty="0" smtClean="0">
+                  <a:solidFill>
+                    <a:schemeClr val="tx1"/>
+                  </a:solidFill>
+                  <a:latin typeface="Times New Roman" panose="02020603050405020304" pitchFamily="18" charset="0"/>
+                  <a:cs typeface="Times New Roman" panose="02020603050405020304" pitchFamily="18" charset="0"/>
+                </a:rPr>
+                <a:t>Tillage</a:t>
+              </a:r>
+              <a:endParaRPr lang="en-US" sz="800" b="1" dirty="0">
+                <a:solidFill>
+                  <a:schemeClr val="tx1"/>
+                </a:solidFill>
+                <a:latin typeface="Times New Roman" panose="02020603050405020304" pitchFamily="18" charset="0"/>
+                <a:cs typeface="Times New Roman" panose="02020603050405020304" pitchFamily="18" charset="0"/>
+              </a:endParaRPr>
+            </a:p>
+          </p:txBody>
+        </p:sp>
+        <p:sp>
+          <p:nvSpPr>
+            <p:cNvPr id="25" name="圆角矩形 24"/>
+            <p:cNvSpPr/>
+            <p:nvPr/>
+          </p:nvSpPr>
+          <p:spPr>
+            <a:xfrm>
+              <a:off x="4742869" y="2492916"/>
+              <a:ext cx="432048" cy="136376"/>
+            </a:xfrm>
+            <a:prstGeom prst="roundRect">
+              <a:avLst/>
+            </a:prstGeom>
+            <a:solidFill>
+              <a:schemeClr val="bg1">
+                <a:lumMod val="85000"/>
+              </a:schemeClr>
+            </a:solidFill>
+            <a:ln w="15875">
+              <a:solidFill>
+                <a:schemeClr val="tx1">
+                  <a:lumMod val="50000"/>
+                  <a:lumOff val="50000"/>
+                </a:schemeClr>
+              </a:solidFill>
+            </a:ln>
+          </p:spPr>
+          <p:style>
+            <a:lnRef idx="2">
+              <a:schemeClr val="accent1">
+                <a:shade val="50000"/>
+              </a:schemeClr>
+            </a:lnRef>
+            <a:fillRef idx="1">
+              <a:schemeClr val="accent1"/>
+            </a:fillRef>
+            <a:effectRef idx="0">
+              <a:schemeClr val="accent1"/>
+            </a:effectRef>
+            <a:fontRef idx="minor">
+              <a:schemeClr val="lt1"/>
+            </a:fontRef>
+          </p:style>
+          <p:txBody>
+            <a:bodyPr lIns="0" tIns="9144" rIns="0" bIns="9144" rtlCol="0" anchor="ctr"/>
+            <a:lstStyle/>
+            <a:p>
+              <a:pPr algn="ctr"/>
+              <a:r>
+                <a:rPr lang="en-US" sz="800" b="1" dirty="0" smtClean="0">
+                  <a:solidFill>
+                    <a:schemeClr val="tx1"/>
+                  </a:solidFill>
+                  <a:latin typeface="Times New Roman" panose="02020603050405020304" pitchFamily="18" charset="0"/>
+                  <a:cs typeface="Times New Roman" panose="02020603050405020304" pitchFamily="18" charset="0"/>
+                </a:rPr>
+                <a:t>Fertilizer</a:t>
+              </a:r>
+              <a:endParaRPr lang="en-US" sz="800" b="1" dirty="0">
+                <a:solidFill>
+                  <a:schemeClr val="tx1"/>
+                </a:solidFill>
+                <a:latin typeface="Times New Roman" panose="02020603050405020304" pitchFamily="18" charset="0"/>
+                <a:cs typeface="Times New Roman" panose="02020603050405020304" pitchFamily="18" charset="0"/>
+              </a:endParaRPr>
+            </a:p>
+          </p:txBody>
+        </p:sp>
+        <p:sp>
+          <p:nvSpPr>
+            <p:cNvPr id="26" name="圆角矩形 25"/>
+            <p:cNvSpPr/>
+            <p:nvPr/>
+          </p:nvSpPr>
+          <p:spPr>
+            <a:xfrm>
+              <a:off x="3988881" y="2750468"/>
+              <a:ext cx="583118" cy="136376"/>
+            </a:xfrm>
+            <a:prstGeom prst="roundRect">
+              <a:avLst/>
+            </a:prstGeom>
+            <a:solidFill>
+              <a:schemeClr val="bg1">
+                <a:lumMod val="85000"/>
+              </a:schemeClr>
+            </a:solidFill>
+            <a:ln w="15875">
+              <a:solidFill>
+                <a:schemeClr val="tx1">
+                  <a:lumMod val="50000"/>
+                  <a:lumOff val="50000"/>
+                </a:schemeClr>
+              </a:solidFill>
+            </a:ln>
+          </p:spPr>
+          <p:style>
+            <a:lnRef idx="2">
+              <a:schemeClr val="accent1">
+                <a:shade val="50000"/>
+              </a:schemeClr>
+            </a:lnRef>
+            <a:fillRef idx="1">
+              <a:schemeClr val="accent1"/>
+            </a:fillRef>
+            <a:effectRef idx="0">
+              <a:schemeClr val="accent1"/>
+            </a:effectRef>
+            <a:fontRef idx="minor">
+              <a:schemeClr val="lt1"/>
+            </a:fontRef>
+          </p:style>
+          <p:txBody>
+            <a:bodyPr lIns="0" tIns="9144" rIns="0" bIns="9144" rtlCol="0" anchor="ctr"/>
+            <a:lstStyle/>
+            <a:p>
+              <a:pPr algn="ctr"/>
+              <a:r>
+                <a:rPr lang="en-US" sz="800" b="1" dirty="0" smtClean="0">
+                  <a:solidFill>
+                    <a:schemeClr val="tx1"/>
+                  </a:solidFill>
+                  <a:latin typeface="Times New Roman" panose="02020603050405020304" pitchFamily="18" charset="0"/>
+                  <a:cs typeface="Times New Roman" panose="02020603050405020304" pitchFamily="18" charset="0"/>
+                </a:rPr>
+                <a:t>Cash crop</a:t>
+              </a:r>
+              <a:endParaRPr lang="en-US" sz="800" b="1" dirty="0">
+                <a:solidFill>
+                  <a:schemeClr val="tx1"/>
+                </a:solidFill>
+                <a:latin typeface="Times New Roman" panose="02020603050405020304" pitchFamily="18" charset="0"/>
+                <a:cs typeface="Times New Roman" panose="02020603050405020304" pitchFamily="18" charset="0"/>
+              </a:endParaRPr>
+            </a:p>
+          </p:txBody>
+        </p:sp>
+        <p:sp>
+          <p:nvSpPr>
+            <p:cNvPr id="29" name="圆角矩形 28"/>
+            <p:cNvSpPr/>
+            <p:nvPr/>
+          </p:nvSpPr>
+          <p:spPr>
+            <a:xfrm>
+              <a:off x="4644008" y="2750468"/>
+              <a:ext cx="590278" cy="136376"/>
+            </a:xfrm>
+            <a:prstGeom prst="roundRect">
+              <a:avLst/>
+            </a:prstGeom>
+            <a:solidFill>
+              <a:schemeClr val="bg1">
+                <a:lumMod val="85000"/>
+              </a:schemeClr>
+            </a:solidFill>
+            <a:ln w="15875">
+              <a:solidFill>
+                <a:schemeClr val="tx1">
+                  <a:lumMod val="50000"/>
+                  <a:lumOff val="50000"/>
+                </a:schemeClr>
+              </a:solidFill>
+            </a:ln>
+          </p:spPr>
+          <p:style>
+            <a:lnRef idx="2">
+              <a:schemeClr val="accent1">
+                <a:shade val="50000"/>
+              </a:schemeClr>
+            </a:lnRef>
+            <a:fillRef idx="1">
+              <a:schemeClr val="accent1"/>
+            </a:fillRef>
+            <a:effectRef idx="0">
+              <a:schemeClr val="accent1"/>
+            </a:effectRef>
+            <a:fontRef idx="minor">
+              <a:schemeClr val="lt1"/>
+            </a:fontRef>
+          </p:style>
+          <p:txBody>
+            <a:bodyPr lIns="0" tIns="9144" rIns="0" bIns="9144" rtlCol="0" anchor="ctr"/>
+            <a:lstStyle/>
+            <a:p>
+              <a:pPr algn="ctr"/>
+              <a:r>
+                <a:rPr lang="en-US" sz="800" b="1" dirty="0" smtClean="0">
+                  <a:solidFill>
+                    <a:schemeClr val="tx1"/>
+                  </a:solidFill>
+                  <a:latin typeface="Times New Roman" panose="02020603050405020304" pitchFamily="18" charset="0"/>
+                  <a:cs typeface="Times New Roman" panose="02020603050405020304" pitchFamily="18" charset="0"/>
+                </a:rPr>
+                <a:t>Control type</a:t>
+              </a:r>
+              <a:endParaRPr lang="en-US" sz="800" b="1" dirty="0">
+                <a:solidFill>
+                  <a:schemeClr val="tx1"/>
+                </a:solidFill>
+                <a:latin typeface="Times New Roman" panose="02020603050405020304" pitchFamily="18" charset="0"/>
+                <a:cs typeface="Times New Roman" panose="02020603050405020304" pitchFamily="18" charset="0"/>
+              </a:endParaRPr>
+            </a:p>
+          </p:txBody>
+        </p:sp>
+        <p:sp>
+          <p:nvSpPr>
+            <p:cNvPr id="30" name="圆角矩形 29"/>
+            <p:cNvSpPr/>
+            <p:nvPr/>
+          </p:nvSpPr>
+          <p:spPr>
+            <a:xfrm>
+              <a:off x="4041476" y="3000380"/>
+              <a:ext cx="530523" cy="134603"/>
+            </a:xfrm>
+            <a:prstGeom prst="roundRect">
+              <a:avLst/>
+            </a:prstGeom>
+            <a:solidFill>
+              <a:schemeClr val="bg1">
+                <a:lumMod val="85000"/>
+              </a:schemeClr>
+            </a:solidFill>
+            <a:ln w="15875">
+              <a:solidFill>
+                <a:schemeClr val="tx1">
+                  <a:lumMod val="50000"/>
+                  <a:lumOff val="50000"/>
+                </a:schemeClr>
+              </a:solidFill>
+            </a:ln>
+          </p:spPr>
+          <p:style>
+            <a:lnRef idx="2">
+              <a:schemeClr val="accent1">
+                <a:shade val="50000"/>
+              </a:schemeClr>
+            </a:lnRef>
+            <a:fillRef idx="1">
+              <a:schemeClr val="accent1"/>
+            </a:fillRef>
+            <a:effectRef idx="0">
+              <a:schemeClr val="accent1"/>
+            </a:effectRef>
+            <a:fontRef idx="minor">
+              <a:schemeClr val="lt1"/>
+            </a:fontRef>
+          </p:style>
+          <p:txBody>
+            <a:bodyPr lIns="0" tIns="9144" rIns="0" bIns="9144" rtlCol="0" anchor="ctr"/>
+            <a:lstStyle/>
+            <a:p>
+              <a:pPr algn="ctr"/>
+              <a:r>
+                <a:rPr lang="en-US" sz="800" b="1" dirty="0" smtClean="0">
+                  <a:solidFill>
+                    <a:schemeClr val="tx1"/>
+                  </a:solidFill>
+                  <a:latin typeface="Times New Roman" panose="02020603050405020304" pitchFamily="18" charset="0"/>
+                  <a:cs typeface="Times New Roman" panose="02020603050405020304" pitchFamily="18" charset="0"/>
+                </a:rPr>
+                <a:t>Soil depth</a:t>
+              </a:r>
+              <a:endParaRPr lang="en-US" sz="800" b="1" dirty="0">
+                <a:solidFill>
+                  <a:schemeClr val="tx1"/>
+                </a:solidFill>
+                <a:latin typeface="Times New Roman" panose="02020603050405020304" pitchFamily="18" charset="0"/>
+                <a:cs typeface="Times New Roman" panose="02020603050405020304" pitchFamily="18" charset="0"/>
+              </a:endParaRPr>
+            </a:p>
+          </p:txBody>
+        </p:sp>
+        <p:sp>
+          <p:nvSpPr>
+            <p:cNvPr id="31" name="圆角矩形 30"/>
+            <p:cNvSpPr/>
+            <p:nvPr/>
+          </p:nvSpPr>
+          <p:spPr>
+            <a:xfrm>
+              <a:off x="4600949" y="3000380"/>
+              <a:ext cx="622000" cy="136376"/>
+            </a:xfrm>
+            <a:prstGeom prst="roundRect">
+              <a:avLst/>
+            </a:prstGeom>
+            <a:solidFill>
+              <a:schemeClr val="bg1">
+                <a:lumMod val="85000"/>
+              </a:schemeClr>
+            </a:solidFill>
+            <a:ln w="15875">
+              <a:solidFill>
+                <a:schemeClr val="tx1">
+                  <a:lumMod val="50000"/>
+                  <a:lumOff val="50000"/>
+                </a:schemeClr>
+              </a:solidFill>
+            </a:ln>
+          </p:spPr>
+          <p:style>
+            <a:lnRef idx="2">
+              <a:schemeClr val="accent1">
+                <a:shade val="50000"/>
+              </a:schemeClr>
+            </a:lnRef>
+            <a:fillRef idx="1">
+              <a:schemeClr val="accent1"/>
+            </a:fillRef>
+            <a:effectRef idx="0">
+              <a:schemeClr val="accent1"/>
+            </a:effectRef>
+            <a:fontRef idx="minor">
+              <a:schemeClr val="lt1"/>
+            </a:fontRef>
+          </p:style>
+          <p:txBody>
+            <a:bodyPr lIns="0" tIns="9144" rIns="0" bIns="9144" rtlCol="0" anchor="ctr"/>
+            <a:lstStyle/>
+            <a:p>
+              <a:pPr algn="ctr"/>
+              <a:r>
+                <a:rPr lang="en-US" sz="800" b="1" dirty="0" smtClean="0">
+                  <a:solidFill>
+                    <a:schemeClr val="tx1"/>
+                  </a:solidFill>
+                  <a:latin typeface="Times New Roman" panose="02020603050405020304" pitchFamily="18" charset="0"/>
+                  <a:cs typeface="Times New Roman" panose="02020603050405020304" pitchFamily="18" charset="0"/>
+                </a:rPr>
+                <a:t>Termination</a:t>
+              </a:r>
+              <a:endParaRPr lang="en-US" sz="800" b="1" dirty="0">
+                <a:solidFill>
+                  <a:schemeClr val="tx1"/>
+                </a:solidFill>
+                <a:latin typeface="Times New Roman" panose="02020603050405020304" pitchFamily="18" charset="0"/>
+                <a:cs typeface="Times New Roman" panose="02020603050405020304" pitchFamily="18" charset="0"/>
+              </a:endParaRPr>
+            </a:p>
+          </p:txBody>
+        </p:sp>
+        <p:sp>
+          <p:nvSpPr>
+            <p:cNvPr id="32" name="圆角矩形 31"/>
+            <p:cNvSpPr/>
+            <p:nvPr/>
+          </p:nvSpPr>
+          <p:spPr>
+            <a:xfrm>
+              <a:off x="4322261" y="3246884"/>
+              <a:ext cx="557376" cy="136376"/>
+            </a:xfrm>
+            <a:prstGeom prst="roundRect">
+              <a:avLst/>
+            </a:prstGeom>
+            <a:solidFill>
+              <a:schemeClr val="bg1">
+                <a:lumMod val="85000"/>
+              </a:schemeClr>
+            </a:solidFill>
+            <a:ln w="15875">
+              <a:solidFill>
+                <a:schemeClr val="tx1">
+                  <a:lumMod val="50000"/>
+                  <a:lumOff val="50000"/>
+                </a:schemeClr>
+              </a:solidFill>
+            </a:ln>
+          </p:spPr>
+          <p:style>
+            <a:lnRef idx="2">
+              <a:schemeClr val="accent1">
+                <a:shade val="50000"/>
+              </a:schemeClr>
+            </a:lnRef>
+            <a:fillRef idx="1">
+              <a:schemeClr val="accent1"/>
+            </a:fillRef>
+            <a:effectRef idx="0">
+              <a:schemeClr val="accent1"/>
+            </a:effectRef>
+            <a:fontRef idx="minor">
+              <a:schemeClr val="lt1"/>
+            </a:fontRef>
+          </p:style>
+          <p:txBody>
+            <a:bodyPr lIns="0" tIns="9144" rIns="0" bIns="9144" rtlCol="0" anchor="ctr"/>
+            <a:lstStyle/>
+            <a:p>
+              <a:pPr algn="ctr"/>
+              <a:r>
+                <a:rPr lang="en-US" sz="800" b="1" dirty="0" smtClean="0">
+                  <a:solidFill>
+                    <a:schemeClr val="tx1"/>
+                  </a:solidFill>
+                  <a:latin typeface="Times New Roman" panose="02020603050405020304" pitchFamily="18" charset="0"/>
+                  <a:cs typeface="Times New Roman" panose="02020603050405020304" pitchFamily="18" charset="0"/>
+                </a:rPr>
+                <a:t>Rotation</a:t>
+              </a:r>
+              <a:endParaRPr lang="en-US" sz="800" b="1" dirty="0">
+                <a:solidFill>
+                  <a:schemeClr val="tx1"/>
+                </a:solidFill>
+                <a:latin typeface="Times New Roman" panose="02020603050405020304" pitchFamily="18" charset="0"/>
+                <a:cs typeface="Times New Roman" panose="02020603050405020304" pitchFamily="18" charset="0"/>
+              </a:endParaRPr>
+            </a:p>
+          </p:txBody>
+        </p:sp>
+      </p:grpSp>
+      <p:cxnSp>
+        <p:nvCxnSpPr>
+          <p:cNvPr id="37" name="肘形连接符 36"/>
+          <p:cNvCxnSpPr>
+            <a:stCxn id="20" idx="2"/>
+            <a:endCxn id="19" idx="1"/>
+          </p:cNvCxnSpPr>
+          <p:nvPr/>
+        </p:nvCxnSpPr>
+        <p:spPr>
+          <a:xfrm rot="10800000">
+            <a:off x="3518733" y="1308589"/>
+            <a:ext cx="152878" cy="1274766"/>
+          </a:xfrm>
+          <a:prstGeom prst="bentConnector3">
+            <a:avLst>
+              <a:gd name="adj1" fmla="val 299375"/>
+            </a:avLst>
+          </a:prstGeom>
+          <a:ln w="15875">
+            <a:solidFill>
+              <a:schemeClr val="bg1">
+                <a:lumMod val="85000"/>
+              </a:schemeClr>
+            </a:solidFill>
+            <a:tailEnd type="stealth"/>
+          </a:ln>
+        </p:spPr>
+        <p:style>
+          <a:lnRef idx="1">
+            <a:schemeClr val="accent1"/>
+          </a:lnRef>
+          <a:fillRef idx="0">
+            <a:schemeClr val="accent1"/>
+          </a:fillRef>
+          <a:effectRef idx="0">
+            <a:schemeClr val="accent1"/>
+          </a:effectRef>
+          <a:fontRef idx="minor">
+            <a:schemeClr val="tx1"/>
+          </a:fontRef>
+        </p:style>
+      </p:cxnSp>
+      <p:sp>
+        <p:nvSpPr>
+          <p:cNvPr id="38" name="矩形 37"/>
+          <p:cNvSpPr/>
+          <p:nvPr/>
+        </p:nvSpPr>
+        <p:spPr>
+          <a:xfrm>
+            <a:off x="3806766" y="3678932"/>
+            <a:ext cx="1584176" cy="288032"/>
+          </a:xfrm>
+          <a:prstGeom prst="rect">
+            <a:avLst/>
+          </a:prstGeom>
+          <a:solidFill>
+            <a:schemeClr val="bg1">
+              <a:lumMod val="95000"/>
+            </a:schemeClr>
+          </a:solidFill>
+          <a:ln w="15875">
+            <a:solidFill>
+              <a:schemeClr val="bg1">
+                <a:lumMod val="85000"/>
+              </a:schemeClr>
+            </a:solidFill>
+          </a:ln>
+        </p:spPr>
+        <p:style>
+          <a:lnRef idx="2">
+            <a:schemeClr val="accent1">
+              <a:shade val="50000"/>
+            </a:schemeClr>
+          </a:lnRef>
+          <a:fillRef idx="1">
+            <a:schemeClr val="accent1"/>
+          </a:fillRef>
+          <a:effectRef idx="0">
+            <a:schemeClr val="accent1"/>
+          </a:effectRef>
+          <a:fontRef idx="minor">
+            <a:schemeClr val="lt1"/>
+          </a:fontRef>
+        </p:style>
+        <p:txBody>
+          <a:bodyPr lIns="45720" rIns="45720" rtlCol="0" anchor="ctr"/>
+          <a:lstStyle/>
+          <a:p>
+            <a:pPr algn="ctr"/>
+            <a:r>
+              <a:rPr lang="en-US" sz="800" b="1" dirty="0" smtClean="0">
+                <a:solidFill>
+                  <a:schemeClr val="tx1"/>
+                </a:solidFill>
+                <a:latin typeface="Times New Roman" panose="02020603050405020304" pitchFamily="18" charset="0"/>
+                <a:cs typeface="Times New Roman" panose="02020603050405020304" pitchFamily="18" charset="0"/>
+              </a:rPr>
+              <a:t>Pairwise comparison between control and treatment  </a:t>
+            </a:r>
+            <a:endParaRPr lang="en-US" sz="800" b="1" dirty="0">
+              <a:solidFill>
+                <a:schemeClr val="tx1"/>
+              </a:solidFill>
+              <a:latin typeface="Times New Roman" panose="02020603050405020304" pitchFamily="18" charset="0"/>
+              <a:cs typeface="Times New Roman" panose="02020603050405020304" pitchFamily="18" charset="0"/>
+            </a:endParaRPr>
+          </a:p>
+        </p:txBody>
+      </p:sp>
+      <p:cxnSp>
+        <p:nvCxnSpPr>
+          <p:cNvPr id="44" name="肘形连接符 43"/>
+          <p:cNvCxnSpPr>
+            <a:stCxn id="20" idx="6"/>
+            <a:endCxn id="66" idx="3"/>
+          </p:cNvCxnSpPr>
+          <p:nvPr/>
+        </p:nvCxnSpPr>
+        <p:spPr>
+          <a:xfrm flipV="1">
+            <a:off x="5530391" y="1308589"/>
+            <a:ext cx="265745" cy="1274766"/>
+          </a:xfrm>
+          <a:prstGeom prst="bentConnector3">
+            <a:avLst>
+              <a:gd name="adj1" fmla="val 221865"/>
+            </a:avLst>
+          </a:prstGeom>
+          <a:ln w="15875">
+            <a:solidFill>
+              <a:schemeClr val="bg1">
+                <a:lumMod val="85000"/>
+              </a:schemeClr>
+            </a:solidFill>
+            <a:tailEnd type="stealth"/>
+          </a:ln>
+        </p:spPr>
+        <p:style>
+          <a:lnRef idx="1">
+            <a:schemeClr val="accent1"/>
+          </a:lnRef>
+          <a:fillRef idx="0">
+            <a:schemeClr val="accent1"/>
+          </a:fillRef>
+          <a:effectRef idx="0">
+            <a:schemeClr val="accent1"/>
+          </a:effectRef>
+          <a:fontRef idx="minor">
+            <a:schemeClr val="tx1"/>
+          </a:fontRef>
+        </p:style>
+      </p:cxnSp>
+      <p:sp>
+        <p:nvSpPr>
+          <p:cNvPr id="66" name="矩形 65"/>
+          <p:cNvSpPr/>
+          <p:nvPr/>
+        </p:nvSpPr>
+        <p:spPr>
+          <a:xfrm>
+            <a:off x="4824028" y="1124744"/>
+            <a:ext cx="972108" cy="367690"/>
+          </a:xfrm>
+          <a:prstGeom prst="rect">
+            <a:avLst/>
+          </a:prstGeom>
+          <a:solidFill>
+            <a:schemeClr val="bg1">
+              <a:lumMod val="95000"/>
+            </a:schemeClr>
+          </a:solidFill>
+          <a:ln w="15875">
+            <a:solidFill>
+              <a:schemeClr val="bg1">
+                <a:lumMod val="85000"/>
+              </a:schemeClr>
+            </a:solidFill>
+          </a:ln>
+        </p:spPr>
+        <p:style>
+          <a:lnRef idx="2">
+            <a:schemeClr val="accent1">
+              <a:shade val="50000"/>
+            </a:schemeClr>
+          </a:lnRef>
+          <a:fillRef idx="1">
+            <a:schemeClr val="accent1"/>
+          </a:fillRef>
+          <a:effectRef idx="0">
+            <a:schemeClr val="accent1"/>
+          </a:effectRef>
+          <a:fontRef idx="minor">
+            <a:schemeClr val="lt1"/>
+          </a:fontRef>
+        </p:style>
+        <p:txBody>
+          <a:bodyPr rIns="9144" rtlCol="0" anchor="ctr"/>
+          <a:lstStyle/>
+          <a:p>
+            <a:pPr algn="ctr"/>
+            <a:r>
+              <a:rPr lang="en-US" sz="900" b="1" dirty="0" smtClean="0">
+                <a:solidFill>
+                  <a:schemeClr val="tx1"/>
+                </a:solidFill>
+                <a:latin typeface="Times New Roman" panose="02020603050405020304" pitchFamily="18" charset="0"/>
+                <a:cs typeface="Times New Roman" panose="02020603050405020304" pitchFamily="18" charset="0"/>
+              </a:rPr>
+              <a:t>Different experiment ID</a:t>
+            </a:r>
+            <a:endParaRPr lang="en-US" sz="900" b="1" dirty="0">
+              <a:solidFill>
+                <a:schemeClr val="tx1"/>
+              </a:solidFill>
+              <a:latin typeface="Times New Roman" panose="02020603050405020304" pitchFamily="18" charset="0"/>
+              <a:cs typeface="Times New Roman" panose="02020603050405020304" pitchFamily="18" charset="0"/>
+            </a:endParaRPr>
+          </a:p>
+        </p:txBody>
+      </p:sp>
+      <p:cxnSp>
+        <p:nvCxnSpPr>
+          <p:cNvPr id="70" name="肘形连接符 69"/>
+          <p:cNvCxnSpPr>
+            <a:stCxn id="19" idx="0"/>
+            <a:endCxn id="66" idx="0"/>
+          </p:cNvCxnSpPr>
+          <p:nvPr/>
+        </p:nvCxnSpPr>
+        <p:spPr>
+          <a:xfrm rot="5400000" flipH="1" flipV="1">
+            <a:off x="4641720" y="456383"/>
+            <a:ext cx="12700" cy="1336723"/>
+          </a:xfrm>
+          <a:prstGeom prst="bentConnector3">
+            <a:avLst>
+              <a:gd name="adj1" fmla="val 1800000"/>
+            </a:avLst>
+          </a:prstGeom>
+          <a:ln w="15875">
+            <a:solidFill>
+              <a:schemeClr val="bg1">
+                <a:lumMod val="85000"/>
+              </a:schemeClr>
+            </a:solidFill>
+          </a:ln>
+        </p:spPr>
+        <p:style>
+          <a:lnRef idx="1">
+            <a:schemeClr val="accent1"/>
+          </a:lnRef>
+          <a:fillRef idx="0">
+            <a:schemeClr val="accent1"/>
+          </a:fillRef>
+          <a:effectRef idx="0">
+            <a:schemeClr val="accent1"/>
+          </a:effectRef>
+          <a:fontRef idx="minor">
+            <a:schemeClr val="tx1"/>
+          </a:fontRef>
+        </p:style>
+      </p:cxnSp>
+      <p:cxnSp>
+        <p:nvCxnSpPr>
+          <p:cNvPr id="83" name="直接箭头连接符 82"/>
+          <p:cNvCxnSpPr>
+            <a:stCxn id="38" idx="0"/>
+            <a:endCxn id="20" idx="4"/>
+          </p:cNvCxnSpPr>
+          <p:nvPr/>
+        </p:nvCxnSpPr>
+        <p:spPr>
+          <a:xfrm flipV="1">
+            <a:off x="4598854" y="3465901"/>
+            <a:ext cx="2147" cy="213031"/>
+          </a:xfrm>
+          <a:prstGeom prst="straightConnector1">
+            <a:avLst/>
+          </a:prstGeom>
+          <a:ln w="15875">
+            <a:solidFill>
+              <a:schemeClr val="bg1">
+                <a:lumMod val="75000"/>
+              </a:schemeClr>
+            </a:solidFill>
+            <a:tailEnd type="arrow"/>
+          </a:ln>
+        </p:spPr>
+        <p:style>
+          <a:lnRef idx="1">
+            <a:schemeClr val="accent1"/>
+          </a:lnRef>
+          <a:fillRef idx="0">
+            <a:schemeClr val="accent1"/>
+          </a:fillRef>
+          <a:effectRef idx="0">
+            <a:schemeClr val="accent1"/>
+          </a:effectRef>
+          <a:fontRef idx="minor">
+            <a:schemeClr val="tx1"/>
+          </a:fontRef>
+        </p:style>
+      </p:cxnSp>
+      <p:cxnSp>
+        <p:nvCxnSpPr>
+          <p:cNvPr id="86" name="直接箭头连接符 85"/>
+          <p:cNvCxnSpPr>
+            <a:endCxn id="38" idx="1"/>
+          </p:cNvCxnSpPr>
+          <p:nvPr/>
+        </p:nvCxnSpPr>
+        <p:spPr>
+          <a:xfrm>
+            <a:off x="2973016" y="3822948"/>
+            <a:ext cx="833750" cy="0"/>
+          </a:xfrm>
+          <a:prstGeom prst="straightConnector1">
+            <a:avLst/>
+          </a:prstGeom>
+          <a:ln w="15875">
+            <a:solidFill>
+              <a:schemeClr val="bg1">
+                <a:lumMod val="75000"/>
+              </a:schemeClr>
+            </a:solidFill>
+            <a:tailEnd type="arrow"/>
+          </a:ln>
+        </p:spPr>
+        <p:style>
+          <a:lnRef idx="1">
+            <a:schemeClr val="accent1"/>
+          </a:lnRef>
+          <a:fillRef idx="0">
+            <a:schemeClr val="accent1"/>
+          </a:fillRef>
+          <a:effectRef idx="0">
+            <a:schemeClr val="accent1"/>
+          </a:effectRef>
+          <a:fontRef idx="minor">
+            <a:schemeClr val="tx1"/>
+          </a:fontRef>
+        </p:style>
+      </p:cxnSp>
+      <p:cxnSp>
+        <p:nvCxnSpPr>
+          <p:cNvPr id="89" name="肘形连接符 88"/>
+          <p:cNvCxnSpPr>
+            <a:endCxn id="17" idx="0"/>
+          </p:cNvCxnSpPr>
+          <p:nvPr/>
+        </p:nvCxnSpPr>
+        <p:spPr>
+          <a:xfrm>
+            <a:off x="4663784" y="692696"/>
+            <a:ext cx="2320484" cy="220573"/>
+          </a:xfrm>
+          <a:prstGeom prst="bentConnector2">
+            <a:avLst/>
+          </a:prstGeom>
+          <a:ln w="15875">
+            <a:solidFill>
+              <a:schemeClr val="bg1">
+                <a:lumMod val="85000"/>
+              </a:schemeClr>
+            </a:solidFill>
+            <a:tailEnd type="stealth"/>
+          </a:ln>
+        </p:spPr>
+        <p:style>
+          <a:lnRef idx="1">
+            <a:schemeClr val="accent1"/>
+          </a:lnRef>
+          <a:fillRef idx="0">
+            <a:schemeClr val="accent1"/>
+          </a:fillRef>
+          <a:effectRef idx="0">
+            <a:schemeClr val="accent1"/>
+          </a:effectRef>
+          <a:fontRef idx="minor">
+            <a:schemeClr val="tx1"/>
+          </a:fontRef>
+        </p:style>
+      </p:cxnSp>
+      <p:cxnSp>
+        <p:nvCxnSpPr>
+          <p:cNvPr id="93" name="直接箭头连接符 92"/>
+          <p:cNvCxnSpPr/>
+          <p:nvPr/>
+        </p:nvCxnSpPr>
+        <p:spPr>
+          <a:xfrm flipV="1">
+            <a:off x="4663784" y="692696"/>
+            <a:ext cx="0" cy="220574"/>
+          </a:xfrm>
+          <a:prstGeom prst="straightConnector1">
+            <a:avLst/>
+          </a:prstGeom>
+          <a:ln w="15875">
+            <a:solidFill>
+              <a:schemeClr val="bg1">
+                <a:lumMod val="85000"/>
+              </a:schemeClr>
+            </a:solidFill>
+            <a:tailEnd type="none"/>
+          </a:ln>
+        </p:spPr>
+        <p:style>
+          <a:lnRef idx="1">
+            <a:schemeClr val="accent1"/>
+          </a:lnRef>
+          <a:fillRef idx="0">
+            <a:schemeClr val="accent1"/>
+          </a:fillRef>
+          <a:effectRef idx="0">
+            <a:schemeClr val="accent1"/>
+          </a:effectRef>
+          <a:fontRef idx="minor">
+            <a:schemeClr val="tx1"/>
+          </a:fontRef>
+        </p:style>
+      </p:cxnSp>
+      <p:sp>
+        <p:nvSpPr>
+          <p:cNvPr id="99" name="矩形 98"/>
+          <p:cNvSpPr/>
+          <p:nvPr/>
+        </p:nvSpPr>
+        <p:spPr>
+          <a:xfrm>
+            <a:off x="6467847" y="3068960"/>
+            <a:ext cx="1008112" cy="392155"/>
+          </a:xfrm>
+          <a:prstGeom prst="rect">
+            <a:avLst/>
+          </a:prstGeom>
+          <a:solidFill>
+            <a:schemeClr val="bg1">
+              <a:lumMod val="95000"/>
+            </a:schemeClr>
+          </a:solidFill>
+          <a:ln w="15875">
+            <a:solidFill>
+              <a:schemeClr val="bg1">
+                <a:lumMod val="85000"/>
+              </a:schemeClr>
+            </a:solidFill>
+          </a:ln>
+        </p:spPr>
+        <p:style>
+          <a:lnRef idx="2">
+            <a:schemeClr val="accent1">
+              <a:shade val="50000"/>
+            </a:schemeClr>
+          </a:lnRef>
+          <a:fillRef idx="1">
+            <a:schemeClr val="accent1"/>
+          </a:fillRef>
+          <a:effectRef idx="0">
+            <a:schemeClr val="accent1"/>
+          </a:effectRef>
+          <a:fontRef idx="minor">
+            <a:schemeClr val="lt1"/>
+          </a:fontRef>
+        </p:style>
+        <p:txBody>
+          <a:bodyPr lIns="9144" rIns="9144" rtlCol="0" anchor="ctr"/>
+          <a:lstStyle/>
+          <a:p>
+            <a:pPr algn="ctr"/>
+            <a:r>
+              <a:rPr lang="en-US" sz="900" b="1" dirty="0" smtClean="0">
+                <a:solidFill>
+                  <a:schemeClr val="tx1"/>
+                </a:solidFill>
+                <a:latin typeface="Times New Roman" panose="02020603050405020304" pitchFamily="18" charset="0"/>
+                <a:cs typeface="Times New Roman" panose="02020603050405020304" pitchFamily="18" charset="0"/>
+              </a:rPr>
+              <a:t>Nonpoint pollution evaluation </a:t>
+            </a:r>
+            <a:endParaRPr lang="en-US" sz="900" b="1" dirty="0">
+              <a:solidFill>
+                <a:schemeClr val="tx1"/>
+              </a:solidFill>
+              <a:latin typeface="Times New Roman" panose="02020603050405020304" pitchFamily="18" charset="0"/>
+              <a:cs typeface="Times New Roman" panose="02020603050405020304" pitchFamily="18" charset="0"/>
+            </a:endParaRPr>
+          </a:p>
+        </p:txBody>
+      </p:sp>
+      <p:sp>
+        <p:nvSpPr>
+          <p:cNvPr id="100" name="矩形 99"/>
+          <p:cNvSpPr/>
+          <p:nvPr/>
+        </p:nvSpPr>
+        <p:spPr>
+          <a:xfrm>
+            <a:off x="6480212" y="3573016"/>
+            <a:ext cx="1008112" cy="392155"/>
+          </a:xfrm>
+          <a:prstGeom prst="rect">
+            <a:avLst/>
+          </a:prstGeom>
+          <a:solidFill>
+            <a:schemeClr val="bg1">
+              <a:lumMod val="95000"/>
+            </a:schemeClr>
+          </a:solidFill>
+          <a:ln w="15875">
+            <a:solidFill>
+              <a:schemeClr val="bg1">
+                <a:lumMod val="85000"/>
+              </a:schemeClr>
+            </a:solidFill>
+          </a:ln>
+        </p:spPr>
+        <p:style>
+          <a:lnRef idx="2">
+            <a:schemeClr val="accent1">
+              <a:shade val="50000"/>
+            </a:schemeClr>
+          </a:lnRef>
+          <a:fillRef idx="1">
+            <a:schemeClr val="accent1"/>
+          </a:fillRef>
+          <a:effectRef idx="0">
+            <a:schemeClr val="accent1"/>
+          </a:effectRef>
+          <a:fontRef idx="minor">
+            <a:schemeClr val="lt1"/>
+          </a:fontRef>
+        </p:style>
+        <p:txBody>
+          <a:bodyPr lIns="9144" rIns="9144" rtlCol="0" anchor="ctr"/>
+          <a:lstStyle/>
+          <a:p>
+            <a:pPr algn="ctr"/>
+            <a:r>
+              <a:rPr lang="en-US" sz="900" b="1" dirty="0" smtClean="0">
+                <a:solidFill>
+                  <a:schemeClr val="tx1"/>
+                </a:solidFill>
+                <a:latin typeface="Times New Roman" panose="02020603050405020304" pitchFamily="18" charset="0"/>
+                <a:cs typeface="Times New Roman" panose="02020603050405020304" pitchFamily="18" charset="0"/>
+              </a:rPr>
+              <a:t>Management recommendation</a:t>
+            </a:r>
+            <a:endParaRPr lang="en-US" sz="900" b="1" dirty="0">
+              <a:solidFill>
+                <a:schemeClr val="tx1"/>
+              </a:solidFill>
+              <a:latin typeface="Times New Roman" panose="02020603050405020304" pitchFamily="18" charset="0"/>
+              <a:cs typeface="Times New Roman" panose="02020603050405020304" pitchFamily="18" charset="0"/>
+            </a:endParaRPr>
+          </a:p>
+        </p:txBody>
+      </p:sp>
+      <p:sp>
+        <p:nvSpPr>
+          <p:cNvPr id="119" name="TextBox 118"/>
+          <p:cNvSpPr txBox="1"/>
+          <p:nvPr/>
+        </p:nvSpPr>
+        <p:spPr>
+          <a:xfrm>
+            <a:off x="3253934" y="2348880"/>
+            <a:ext cx="453970" cy="230832"/>
+          </a:xfrm>
+          <a:prstGeom prst="rect">
+            <a:avLst/>
+          </a:prstGeom>
+          <a:noFill/>
+        </p:spPr>
+        <p:txBody>
+          <a:bodyPr wrap="none" rtlCol="0">
+            <a:spAutoFit/>
+          </a:bodyPr>
+          <a:lstStyle/>
+          <a:p>
+            <a:r>
+              <a:rPr lang="en-US" sz="900" b="1" dirty="0" smtClean="0">
+                <a:latin typeface="Times New Roman" panose="02020603050405020304" pitchFamily="18" charset="0"/>
+                <a:cs typeface="Times New Roman" panose="02020603050405020304" pitchFamily="18" charset="0"/>
+              </a:rPr>
+              <a:t>Same</a:t>
+            </a:r>
+            <a:endParaRPr lang="en-US" sz="900" b="1" dirty="0">
+              <a:latin typeface="Times New Roman" panose="02020603050405020304" pitchFamily="18" charset="0"/>
+              <a:cs typeface="Times New Roman" panose="02020603050405020304" pitchFamily="18" charset="0"/>
+            </a:endParaRPr>
+          </a:p>
+        </p:txBody>
+      </p:sp>
+      <p:sp>
+        <p:nvSpPr>
+          <p:cNvPr id="120" name="TextBox 119"/>
+          <p:cNvSpPr txBox="1"/>
+          <p:nvPr/>
+        </p:nvSpPr>
+        <p:spPr>
+          <a:xfrm>
+            <a:off x="5493246" y="2327820"/>
+            <a:ext cx="633507" cy="230832"/>
+          </a:xfrm>
+          <a:prstGeom prst="rect">
+            <a:avLst/>
+          </a:prstGeom>
+          <a:noFill/>
+        </p:spPr>
+        <p:txBody>
+          <a:bodyPr wrap="none" rtlCol="0">
+            <a:spAutoFit/>
+          </a:bodyPr>
+          <a:lstStyle/>
+          <a:p>
+            <a:r>
+              <a:rPr lang="en-US" sz="900" b="1" dirty="0" smtClean="0">
+                <a:latin typeface="Times New Roman" panose="02020603050405020304" pitchFamily="18" charset="0"/>
+                <a:cs typeface="Times New Roman" panose="02020603050405020304" pitchFamily="18" charset="0"/>
+              </a:rPr>
+              <a:t>Different</a:t>
+            </a:r>
+            <a:endParaRPr lang="en-US" sz="900" b="1" dirty="0">
+              <a:latin typeface="Times New Roman" panose="02020603050405020304" pitchFamily="18" charset="0"/>
+              <a:cs typeface="Times New Roman" panose="02020603050405020304" pitchFamily="18" charset="0"/>
+            </a:endParaRPr>
+          </a:p>
+        </p:txBody>
+      </p:sp>
+    </p:spTree>
+    <p:extLst>
+      <p:ext uri="{BB962C8B-B14F-4D97-AF65-F5344CB8AC3E}">
+        <p14:creationId xmlns:p14="http://schemas.microsoft.com/office/powerpoint/2010/main" val="2674692492"/>
+      </p:ext>
+    </p:extLst>
+  </p:cSld>
+  <p:clrMapOvr>
+    <a:masterClrMapping/>
+  </p:clrMapOvr>
+  <p:timing>
+    <p:tnLst>
+      <p:par>
+        <p:cTn id="1" dur="indefinite" restart="never" nodeType="tmRoot"/>
+      </p:par>
+    </p:tnLst>
+  </p:timing>
+</p:sld>
+</file>
+
+<file path=ppt/slides/slide2.xml><?xml version="1.0" encoding="utf-8"?>
+<p:sld xmlns:a="http://schemas.openxmlformats.org/drawingml/2006/main" xmlns:r="http://schemas.openxmlformats.org/officeDocument/2006/relationships" xmlns:p="http://schemas.openxmlformats.org/presentationml/2006/main">
+  <p:cSld>
+    <p:spTree>
+      <p:nvGrpSpPr>
+        <p:cNvPr id="1" name=""/>
+        <p:cNvGrpSpPr/>
+        <p:nvPr/>
+      </p:nvGrpSpPr>
+      <p:grpSpPr>
+        <a:xfrm>
+          <a:off x="0" y="0"/>
+          <a:ext cx="0" cy="0"/>
+          <a:chOff x="0" y="0"/>
+          <a:chExt cx="0" cy="0"/>
+        </a:xfrm>
+      </p:grpSpPr>
+      <p:sp>
+        <p:nvSpPr>
           <p:cNvPr id="29" name="矩形 28"/>
           <p:cNvSpPr/>
           <p:nvPr/>
@@ -4815,7 +7018,7 @@
 </p:sld>
 </file>
 
-<file path=ppt/slides/slide2.xml><?xml version="1.0" encoding="utf-8"?>
+<file path=ppt/slides/slide3.xml><?xml version="1.0" encoding="utf-8"?>
 <p:sld xmlns:a="http://schemas.openxmlformats.org/drawingml/2006/main" xmlns:r="http://schemas.openxmlformats.org/officeDocument/2006/relationships" xmlns:p="http://schemas.openxmlformats.org/presentationml/2006/main">
   <p:cSld>
     <p:spTree>
@@ -4832,882 +7035,1027 @@
           <a:chExt cx="0" cy="0"/>
         </a:xfrm>
       </p:grpSpPr>
-      <p:sp>
-        <p:nvSpPr>
-          <p:cNvPr id="33" name="矩形 32"/>
-          <p:cNvSpPr/>
+      <p:grpSp>
+        <p:nvGrpSpPr>
+          <p:cNvPr id="107" name="组合 106"/>
+          <p:cNvGrpSpPr/>
           <p:nvPr/>
-        </p:nvSpPr>
-        <p:spPr>
+        </p:nvGrpSpPr>
+        <p:grpSpPr>
           <a:xfrm>
-            <a:off x="1748880" y="913269"/>
-            <a:ext cx="1224136" cy="3163803"/>
-          </a:xfrm>
-          <a:prstGeom prst="rect">
-            <a:avLst/>
-          </a:prstGeom>
-          <a:noFill/>
-          <a:ln>
+            <a:off x="1455209" y="1090836"/>
+            <a:ext cx="2551810" cy="2338164"/>
+            <a:chOff x="1455209" y="1090836"/>
+            <a:chExt cx="2551810" cy="2338164"/>
+          </a:xfrm>
+        </p:grpSpPr>
+        <p:sp>
+          <p:nvSpPr>
+            <p:cNvPr id="19" name="矩形 18"/>
+            <p:cNvSpPr/>
+            <p:nvPr/>
+          </p:nvSpPr>
+          <p:spPr>
+            <a:xfrm>
+              <a:off x="1619672" y="1090836"/>
+              <a:ext cx="2160240" cy="288032"/>
+            </a:xfrm>
+            <a:prstGeom prst="rect">
+              <a:avLst/>
+            </a:prstGeom>
+            <a:solidFill>
+              <a:schemeClr val="bg1">
+                <a:lumMod val="95000"/>
+              </a:schemeClr>
+            </a:solidFill>
+            <a:ln>
+              <a:solidFill>
+                <a:schemeClr val="bg1">
+                  <a:lumMod val="85000"/>
+                </a:schemeClr>
+              </a:solidFill>
+            </a:ln>
+          </p:spPr>
+          <p:style>
+            <a:lnRef idx="2">
+              <a:schemeClr val="accent1">
+                <a:shade val="50000"/>
+              </a:schemeClr>
+            </a:lnRef>
+            <a:fillRef idx="1">
+              <a:schemeClr val="accent1"/>
+            </a:fillRef>
+            <a:effectRef idx="0">
+              <a:schemeClr val="accent1"/>
+            </a:effectRef>
+            <a:fontRef idx="minor">
+              <a:schemeClr val="lt1"/>
+            </a:fontRef>
+          </p:style>
+          <p:txBody>
+            <a:bodyPr rtlCol="0" anchor="ctr"/>
+            <a:lstStyle/>
+            <a:p>
+              <a:pPr algn="ctr"/>
+              <a:r>
+                <a:rPr lang="en-US" sz="900" b="1" dirty="0" smtClean="0">
+                  <a:solidFill>
+                    <a:schemeClr val="tx1"/>
+                  </a:solidFill>
+                  <a:latin typeface="Arial" panose="020B0604020202020204" pitchFamily="34" charset="0"/>
+                  <a:cs typeface="Arial" panose="020B0604020202020204" pitchFamily="34" charset="0"/>
+                </a:rPr>
+                <a:t>Every soil carbon comparison between control and cover crop</a:t>
+              </a:r>
+              <a:endParaRPr lang="en-US" sz="900" b="1" dirty="0">
+                <a:solidFill>
+                  <a:schemeClr val="tx1"/>
+                </a:solidFill>
+                <a:latin typeface="Arial" panose="020B0604020202020204" pitchFamily="34" charset="0"/>
+                <a:cs typeface="Arial" panose="020B0604020202020204" pitchFamily="34" charset="0"/>
+              </a:endParaRPr>
+            </a:p>
+          </p:txBody>
+        </p:sp>
+        <p:sp>
+          <p:nvSpPr>
+            <p:cNvPr id="4" name="椭圆 3"/>
+            <p:cNvSpPr/>
+            <p:nvPr/>
+          </p:nvSpPr>
+          <p:spPr>
+            <a:xfrm>
+              <a:off x="1979712" y="1556792"/>
+              <a:ext cx="1440160" cy="1440160"/>
+            </a:xfrm>
+            <a:prstGeom prst="ellipse">
+              <a:avLst/>
+            </a:prstGeom>
+            <a:solidFill>
+              <a:schemeClr val="bg1">
+                <a:lumMod val="95000"/>
+              </a:schemeClr>
+            </a:solidFill>
+            <a:ln>
+              <a:solidFill>
+                <a:schemeClr val="bg1">
+                  <a:lumMod val="85000"/>
+                </a:schemeClr>
+              </a:solidFill>
+            </a:ln>
+          </p:spPr>
+          <p:style>
+            <a:lnRef idx="2">
+              <a:schemeClr val="accent1">
+                <a:shade val="50000"/>
+              </a:schemeClr>
+            </a:lnRef>
+            <a:fillRef idx="1">
+              <a:schemeClr val="accent1"/>
+            </a:fillRef>
+            <a:effectRef idx="0">
+              <a:schemeClr val="accent1"/>
+            </a:effectRef>
+            <a:fontRef idx="minor">
+              <a:schemeClr val="lt1"/>
+            </a:fontRef>
+          </p:style>
+          <p:txBody>
+            <a:bodyPr rtlCol="0" anchor="ctr"/>
+            <a:lstStyle/>
+            <a:p>
+              <a:pPr algn="ctr"/>
+              <a:endParaRPr lang="en-US"/>
+            </a:p>
+          </p:txBody>
+        </p:sp>
+        <p:sp>
+          <p:nvSpPr>
+            <p:cNvPr id="6" name="圆角矩形 5"/>
+            <p:cNvSpPr/>
+            <p:nvPr/>
+          </p:nvSpPr>
+          <p:spPr>
+            <a:xfrm>
+              <a:off x="2305844" y="1700808"/>
+              <a:ext cx="792088" cy="144016"/>
+            </a:xfrm>
+            <a:prstGeom prst="roundRect">
+              <a:avLst/>
+            </a:prstGeom>
             <a:solidFill>
               <a:schemeClr val="bg1">
                 <a:lumMod val="85000"/>
               </a:schemeClr>
             </a:solidFill>
-          </a:ln>
-        </p:spPr>
-        <p:style>
-          <a:lnRef idx="2">
-            <a:schemeClr val="accent1">
-              <a:shade val="50000"/>
-            </a:schemeClr>
-          </a:lnRef>
-          <a:fillRef idx="1">
-            <a:schemeClr val="accent1"/>
-          </a:fillRef>
-          <a:effectRef idx="0">
-            <a:schemeClr val="accent1"/>
-          </a:effectRef>
-          <a:fontRef idx="minor">
-            <a:schemeClr val="lt1"/>
-          </a:fontRef>
-        </p:style>
-        <p:txBody>
-          <a:bodyPr rtlCol="0" anchor="ctr"/>
-          <a:lstStyle/>
-          <a:p>
-            <a:endParaRPr lang="en-US" sz="900" b="1" dirty="0">
+            <a:ln w="12700">
+              <a:solidFill>
+                <a:schemeClr val="tx1">
+                  <a:lumMod val="50000"/>
+                  <a:lumOff val="50000"/>
+                </a:schemeClr>
+              </a:solidFill>
+            </a:ln>
+          </p:spPr>
+          <p:style>
+            <a:lnRef idx="2">
+              <a:schemeClr val="accent1">
+                <a:shade val="50000"/>
+              </a:schemeClr>
+            </a:lnRef>
+            <a:fillRef idx="1">
+              <a:schemeClr val="accent1"/>
+            </a:fillRef>
+            <a:effectRef idx="0">
+              <a:schemeClr val="accent1"/>
+            </a:effectRef>
+            <a:fontRef idx="minor">
+              <a:schemeClr val="lt1"/>
+            </a:fontRef>
+          </p:style>
+          <p:txBody>
+            <a:bodyPr lIns="0" tIns="9144" rIns="0" bIns="9144" rtlCol="0" anchor="ctr"/>
+            <a:lstStyle/>
+            <a:p>
+              <a:pPr algn="ctr"/>
+              <a:r>
+                <a:rPr lang="en-US" sz="700" b="1" dirty="0" smtClean="0">
+                  <a:solidFill>
+                    <a:schemeClr val="tx1"/>
+                  </a:solidFill>
+                  <a:latin typeface="Arial" panose="020B0604020202020204" pitchFamily="34" charset="0"/>
+                  <a:cs typeface="Arial" panose="020B0604020202020204" pitchFamily="34" charset="0"/>
+                </a:rPr>
+                <a:t>Cover crop group</a:t>
+              </a:r>
+              <a:endParaRPr lang="en-US" sz="700" b="1" dirty="0">
+                <a:solidFill>
+                  <a:schemeClr val="tx1"/>
+                </a:solidFill>
+                <a:latin typeface="Arial" panose="020B0604020202020204" pitchFamily="34" charset="0"/>
+                <a:cs typeface="Arial" panose="020B0604020202020204" pitchFamily="34" charset="0"/>
+              </a:endParaRPr>
+            </a:p>
+          </p:txBody>
+        </p:sp>
+        <p:sp>
+          <p:nvSpPr>
+            <p:cNvPr id="24" name="圆角矩形 23"/>
+            <p:cNvSpPr/>
+            <p:nvPr/>
+          </p:nvSpPr>
+          <p:spPr>
+            <a:xfrm>
+              <a:off x="2123728" y="1947312"/>
+              <a:ext cx="216024" cy="144016"/>
+            </a:xfrm>
+            <a:prstGeom prst="roundRect">
+              <a:avLst/>
+            </a:prstGeom>
+            <a:solidFill>
+              <a:schemeClr val="bg1">
+                <a:lumMod val="85000"/>
+              </a:schemeClr>
+            </a:solidFill>
+            <a:ln w="12700">
+              <a:solidFill>
+                <a:schemeClr val="tx1">
+                  <a:lumMod val="50000"/>
+                  <a:lumOff val="50000"/>
+                </a:schemeClr>
+              </a:solidFill>
+            </a:ln>
+          </p:spPr>
+          <p:style>
+            <a:lnRef idx="2">
+              <a:schemeClr val="accent1">
+                <a:shade val="50000"/>
+              </a:schemeClr>
+            </a:lnRef>
+            <a:fillRef idx="1">
+              <a:schemeClr val="accent1"/>
+            </a:fillRef>
+            <a:effectRef idx="0">
+              <a:schemeClr val="accent1"/>
+            </a:effectRef>
+            <a:fontRef idx="minor">
+              <a:schemeClr val="lt1"/>
+            </a:fontRef>
+          </p:style>
+          <p:txBody>
+            <a:bodyPr lIns="0" tIns="9144" rIns="0" bIns="9144" rtlCol="0" anchor="ctr"/>
+            <a:lstStyle/>
+            <a:p>
+              <a:pPr algn="ctr"/>
+              <a:r>
+                <a:rPr lang="en-US" sz="700" b="1" dirty="0" smtClean="0">
+                  <a:solidFill>
+                    <a:schemeClr val="tx1"/>
+                  </a:solidFill>
+                  <a:latin typeface="Arial" panose="020B0604020202020204" pitchFamily="34" charset="0"/>
+                  <a:cs typeface="Arial" panose="020B0604020202020204" pitchFamily="34" charset="0"/>
+                </a:rPr>
+                <a:t>Site</a:t>
+              </a:r>
+              <a:endParaRPr lang="en-US" sz="700" b="1" dirty="0">
+                <a:solidFill>
+                  <a:schemeClr val="tx1"/>
+                </a:solidFill>
+                <a:latin typeface="Arial" panose="020B0604020202020204" pitchFamily="34" charset="0"/>
+                <a:cs typeface="Arial" panose="020B0604020202020204" pitchFamily="34" charset="0"/>
+              </a:endParaRPr>
+            </a:p>
+          </p:txBody>
+        </p:sp>
+        <p:sp>
+          <p:nvSpPr>
+            <p:cNvPr id="25" name="圆角矩形 24"/>
+            <p:cNvSpPr/>
+            <p:nvPr/>
+          </p:nvSpPr>
+          <p:spPr>
+            <a:xfrm>
+              <a:off x="2411760" y="1954952"/>
+              <a:ext cx="360040" cy="136376"/>
+            </a:xfrm>
+            <a:prstGeom prst="roundRect">
+              <a:avLst/>
+            </a:prstGeom>
+            <a:solidFill>
+              <a:schemeClr val="bg1">
+                <a:lumMod val="85000"/>
+              </a:schemeClr>
+            </a:solidFill>
+            <a:ln w="12700">
+              <a:solidFill>
+                <a:schemeClr val="tx1">
+                  <a:lumMod val="50000"/>
+                  <a:lumOff val="50000"/>
+                </a:schemeClr>
+              </a:solidFill>
+            </a:ln>
+          </p:spPr>
+          <p:style>
+            <a:lnRef idx="2">
+              <a:schemeClr val="accent1">
+                <a:shade val="50000"/>
+              </a:schemeClr>
+            </a:lnRef>
+            <a:fillRef idx="1">
+              <a:schemeClr val="accent1"/>
+            </a:fillRef>
+            <a:effectRef idx="0">
+              <a:schemeClr val="accent1"/>
+            </a:effectRef>
+            <a:fontRef idx="minor">
+              <a:schemeClr val="lt1"/>
+            </a:fontRef>
+          </p:style>
+          <p:txBody>
+            <a:bodyPr lIns="0" tIns="9144" rIns="0" bIns="9144" rtlCol="0" anchor="ctr"/>
+            <a:lstStyle/>
+            <a:p>
+              <a:pPr algn="ctr"/>
+              <a:r>
+                <a:rPr lang="en-US" sz="700" b="1" dirty="0" smtClean="0">
+                  <a:solidFill>
+                    <a:schemeClr val="tx1"/>
+                  </a:solidFill>
+                  <a:latin typeface="Arial" panose="020B0604020202020204" pitchFamily="34" charset="0"/>
+                  <a:cs typeface="Arial" panose="020B0604020202020204" pitchFamily="34" charset="0"/>
+                </a:rPr>
+                <a:t>Tillage</a:t>
+              </a:r>
+              <a:endParaRPr lang="en-US" sz="700" b="1" dirty="0">
+                <a:solidFill>
+                  <a:schemeClr val="tx1"/>
+                </a:solidFill>
+                <a:latin typeface="Arial" panose="020B0604020202020204" pitchFamily="34" charset="0"/>
+                <a:cs typeface="Arial" panose="020B0604020202020204" pitchFamily="34" charset="0"/>
+              </a:endParaRPr>
+            </a:p>
+          </p:txBody>
+        </p:sp>
+        <p:sp>
+          <p:nvSpPr>
+            <p:cNvPr id="26" name="圆角矩形 25"/>
+            <p:cNvSpPr/>
+            <p:nvPr/>
+          </p:nvSpPr>
+          <p:spPr>
+            <a:xfrm>
+              <a:off x="2843808" y="1954952"/>
+              <a:ext cx="432048" cy="136376"/>
+            </a:xfrm>
+            <a:prstGeom prst="roundRect">
+              <a:avLst/>
+            </a:prstGeom>
+            <a:solidFill>
+              <a:schemeClr val="bg1">
+                <a:lumMod val="85000"/>
+              </a:schemeClr>
+            </a:solidFill>
+            <a:ln w="12700">
+              <a:solidFill>
+                <a:schemeClr val="tx1">
+                  <a:lumMod val="50000"/>
+                  <a:lumOff val="50000"/>
+                </a:schemeClr>
+              </a:solidFill>
+            </a:ln>
+          </p:spPr>
+          <p:style>
+            <a:lnRef idx="2">
+              <a:schemeClr val="accent1">
+                <a:shade val="50000"/>
+              </a:schemeClr>
+            </a:lnRef>
+            <a:fillRef idx="1">
+              <a:schemeClr val="accent1"/>
+            </a:fillRef>
+            <a:effectRef idx="0">
+              <a:schemeClr val="accent1"/>
+            </a:effectRef>
+            <a:fontRef idx="minor">
+              <a:schemeClr val="lt1"/>
+            </a:fontRef>
+          </p:style>
+          <p:txBody>
+            <a:bodyPr lIns="0" tIns="9144" rIns="0" bIns="9144" rtlCol="0" anchor="ctr"/>
+            <a:lstStyle/>
+            <a:p>
+              <a:pPr algn="ctr"/>
+              <a:r>
+                <a:rPr lang="en-US" sz="700" b="1" dirty="0" smtClean="0">
+                  <a:solidFill>
+                    <a:schemeClr val="tx1"/>
+                  </a:solidFill>
+                  <a:latin typeface="Arial" panose="020B0604020202020204" pitchFamily="34" charset="0"/>
+                  <a:cs typeface="Arial" panose="020B0604020202020204" pitchFamily="34" charset="0"/>
+                </a:rPr>
+                <a:t>Fertilizer</a:t>
+              </a:r>
+              <a:endParaRPr lang="en-US" sz="700" b="1" dirty="0">
+                <a:solidFill>
+                  <a:schemeClr val="tx1"/>
+                </a:solidFill>
+                <a:latin typeface="Arial" panose="020B0604020202020204" pitchFamily="34" charset="0"/>
+                <a:cs typeface="Arial" panose="020B0604020202020204" pitchFamily="34" charset="0"/>
+              </a:endParaRPr>
+            </a:p>
+          </p:txBody>
+        </p:sp>
+        <p:sp>
+          <p:nvSpPr>
+            <p:cNvPr id="29" name="圆角矩形 28"/>
+            <p:cNvSpPr/>
+            <p:nvPr/>
+          </p:nvSpPr>
+          <p:spPr>
+            <a:xfrm>
+              <a:off x="2089820" y="2212504"/>
+              <a:ext cx="609972" cy="136376"/>
+            </a:xfrm>
+            <a:prstGeom prst="roundRect">
+              <a:avLst/>
+            </a:prstGeom>
+            <a:solidFill>
+              <a:schemeClr val="bg1">
+                <a:lumMod val="85000"/>
+              </a:schemeClr>
+            </a:solidFill>
+            <a:ln w="12700">
+              <a:solidFill>
+                <a:schemeClr val="tx1">
+                  <a:lumMod val="50000"/>
+                  <a:lumOff val="50000"/>
+                </a:schemeClr>
+              </a:solidFill>
+            </a:ln>
+          </p:spPr>
+          <p:style>
+            <a:lnRef idx="2">
+              <a:schemeClr val="accent1">
+                <a:shade val="50000"/>
+              </a:schemeClr>
+            </a:lnRef>
+            <a:fillRef idx="1">
+              <a:schemeClr val="accent1"/>
+            </a:fillRef>
+            <a:effectRef idx="0">
+              <a:schemeClr val="accent1"/>
+            </a:effectRef>
+            <a:fontRef idx="minor">
+              <a:schemeClr val="lt1"/>
+            </a:fontRef>
+          </p:style>
+          <p:txBody>
+            <a:bodyPr lIns="0" tIns="9144" rIns="0" bIns="9144" rtlCol="0" anchor="ctr"/>
+            <a:lstStyle/>
+            <a:p>
+              <a:pPr algn="ctr"/>
+              <a:r>
+                <a:rPr lang="en-US" sz="700" b="1" dirty="0" smtClean="0">
+                  <a:solidFill>
+                    <a:schemeClr val="tx1"/>
+                  </a:solidFill>
+                  <a:latin typeface="Arial" panose="020B0604020202020204" pitchFamily="34" charset="0"/>
+                  <a:cs typeface="Arial" panose="020B0604020202020204" pitchFamily="34" charset="0"/>
+                </a:rPr>
+                <a:t>Cash crop</a:t>
+              </a:r>
+              <a:endParaRPr lang="en-US" sz="700" b="1" dirty="0">
+                <a:solidFill>
+                  <a:schemeClr val="tx1"/>
+                </a:solidFill>
+                <a:latin typeface="Arial" panose="020B0604020202020204" pitchFamily="34" charset="0"/>
+                <a:cs typeface="Arial" panose="020B0604020202020204" pitchFamily="34" charset="0"/>
+              </a:endParaRPr>
+            </a:p>
+          </p:txBody>
+        </p:sp>
+        <p:sp>
+          <p:nvSpPr>
+            <p:cNvPr id="30" name="圆角矩形 29"/>
+            <p:cNvSpPr/>
+            <p:nvPr/>
+          </p:nvSpPr>
+          <p:spPr>
+            <a:xfrm>
+              <a:off x="2771800" y="2212504"/>
+              <a:ext cx="573968" cy="136376"/>
+            </a:xfrm>
+            <a:prstGeom prst="roundRect">
+              <a:avLst/>
+            </a:prstGeom>
+            <a:solidFill>
+              <a:schemeClr val="bg1">
+                <a:lumMod val="85000"/>
+              </a:schemeClr>
+            </a:solidFill>
+            <a:ln w="12700">
+              <a:solidFill>
+                <a:schemeClr val="tx1">
+                  <a:lumMod val="50000"/>
+                  <a:lumOff val="50000"/>
+                </a:schemeClr>
+              </a:solidFill>
+            </a:ln>
+          </p:spPr>
+          <p:style>
+            <a:lnRef idx="2">
+              <a:schemeClr val="accent1">
+                <a:shade val="50000"/>
+              </a:schemeClr>
+            </a:lnRef>
+            <a:fillRef idx="1">
+              <a:schemeClr val="accent1"/>
+            </a:fillRef>
+            <a:effectRef idx="0">
+              <a:schemeClr val="accent1"/>
+            </a:effectRef>
+            <a:fontRef idx="minor">
+              <a:schemeClr val="lt1"/>
+            </a:fontRef>
+          </p:style>
+          <p:txBody>
+            <a:bodyPr lIns="0" tIns="9144" rIns="0" bIns="9144" rtlCol="0" anchor="ctr"/>
+            <a:lstStyle/>
+            <a:p>
+              <a:pPr algn="ctr"/>
+              <a:r>
+                <a:rPr lang="en-US" sz="700" b="1" dirty="0" smtClean="0">
+                  <a:solidFill>
+                    <a:schemeClr val="tx1"/>
+                  </a:solidFill>
+                  <a:latin typeface="Arial" panose="020B0604020202020204" pitchFamily="34" charset="0"/>
+                  <a:cs typeface="Arial" panose="020B0604020202020204" pitchFamily="34" charset="0"/>
+                </a:rPr>
+                <a:t>Control type</a:t>
+              </a:r>
+              <a:endParaRPr lang="en-US" sz="700" b="1" dirty="0">
+                <a:solidFill>
+                  <a:schemeClr val="tx1"/>
+                </a:solidFill>
+                <a:latin typeface="Arial" panose="020B0604020202020204" pitchFamily="34" charset="0"/>
+                <a:cs typeface="Arial" panose="020B0604020202020204" pitchFamily="34" charset="0"/>
+              </a:endParaRPr>
+            </a:p>
+          </p:txBody>
+        </p:sp>
+        <p:sp>
+          <p:nvSpPr>
+            <p:cNvPr id="31" name="圆角矩形 30"/>
+            <p:cNvSpPr/>
+            <p:nvPr/>
+          </p:nvSpPr>
+          <p:spPr>
+            <a:xfrm>
+              <a:off x="2142416" y="2462416"/>
+              <a:ext cx="557376" cy="136376"/>
+            </a:xfrm>
+            <a:prstGeom prst="roundRect">
+              <a:avLst/>
+            </a:prstGeom>
+            <a:solidFill>
+              <a:schemeClr val="bg1">
+                <a:lumMod val="85000"/>
+              </a:schemeClr>
+            </a:solidFill>
+            <a:ln w="12700">
+              <a:solidFill>
+                <a:schemeClr val="tx1">
+                  <a:lumMod val="50000"/>
+                  <a:lumOff val="50000"/>
+                </a:schemeClr>
+              </a:solidFill>
+            </a:ln>
+          </p:spPr>
+          <p:style>
+            <a:lnRef idx="2">
+              <a:schemeClr val="accent1">
+                <a:shade val="50000"/>
+              </a:schemeClr>
+            </a:lnRef>
+            <a:fillRef idx="1">
+              <a:schemeClr val="accent1"/>
+            </a:fillRef>
+            <a:effectRef idx="0">
+              <a:schemeClr val="accent1"/>
+            </a:effectRef>
+            <a:fontRef idx="minor">
+              <a:schemeClr val="lt1"/>
+            </a:fontRef>
+          </p:style>
+          <p:txBody>
+            <a:bodyPr lIns="0" tIns="9144" rIns="0" bIns="9144" rtlCol="0" anchor="ctr"/>
+            <a:lstStyle/>
+            <a:p>
+              <a:pPr algn="ctr"/>
+              <a:r>
+                <a:rPr lang="en-US" sz="700" b="1" dirty="0" smtClean="0">
+                  <a:solidFill>
+                    <a:schemeClr val="tx1"/>
+                  </a:solidFill>
+                  <a:latin typeface="Arial" panose="020B0604020202020204" pitchFamily="34" charset="0"/>
+                  <a:cs typeface="Arial" panose="020B0604020202020204" pitchFamily="34" charset="0"/>
+                </a:rPr>
+                <a:t>Soil depth</a:t>
+              </a:r>
+              <a:endParaRPr lang="en-US" sz="700" b="1" dirty="0">
+                <a:solidFill>
+                  <a:schemeClr val="tx1"/>
+                </a:solidFill>
+                <a:latin typeface="Arial" panose="020B0604020202020204" pitchFamily="34" charset="0"/>
+                <a:cs typeface="Arial" panose="020B0604020202020204" pitchFamily="34" charset="0"/>
+              </a:endParaRPr>
+            </a:p>
+          </p:txBody>
+        </p:sp>
+        <p:sp>
+          <p:nvSpPr>
+            <p:cNvPr id="32" name="圆角矩形 31"/>
+            <p:cNvSpPr/>
+            <p:nvPr/>
+          </p:nvSpPr>
+          <p:spPr>
+            <a:xfrm>
+              <a:off x="2766512" y="2462416"/>
+              <a:ext cx="557376" cy="136376"/>
+            </a:xfrm>
+            <a:prstGeom prst="roundRect">
+              <a:avLst/>
+            </a:prstGeom>
+            <a:solidFill>
+              <a:schemeClr val="bg1">
+                <a:lumMod val="85000"/>
+              </a:schemeClr>
+            </a:solidFill>
+            <a:ln w="12700">
+              <a:solidFill>
+                <a:schemeClr val="tx1">
+                  <a:lumMod val="50000"/>
+                  <a:lumOff val="50000"/>
+                </a:schemeClr>
+              </a:solidFill>
+            </a:ln>
+          </p:spPr>
+          <p:style>
+            <a:lnRef idx="2">
+              <a:schemeClr val="accent1">
+                <a:shade val="50000"/>
+              </a:schemeClr>
+            </a:lnRef>
+            <a:fillRef idx="1">
+              <a:schemeClr val="accent1"/>
+            </a:fillRef>
+            <a:effectRef idx="0">
+              <a:schemeClr val="accent1"/>
+            </a:effectRef>
+            <a:fontRef idx="minor">
+              <a:schemeClr val="lt1"/>
+            </a:fontRef>
+          </p:style>
+          <p:txBody>
+            <a:bodyPr lIns="0" tIns="9144" rIns="0" bIns="9144" rtlCol="0" anchor="ctr"/>
+            <a:lstStyle/>
+            <a:p>
+              <a:pPr algn="ctr"/>
+              <a:r>
+                <a:rPr lang="en-US" sz="700" b="1" dirty="0" smtClean="0">
+                  <a:solidFill>
+                    <a:schemeClr val="tx1"/>
+                  </a:solidFill>
+                  <a:latin typeface="Arial" panose="020B0604020202020204" pitchFamily="34" charset="0"/>
+                  <a:cs typeface="Arial" panose="020B0604020202020204" pitchFamily="34" charset="0"/>
+                </a:rPr>
+                <a:t>Termination</a:t>
+              </a:r>
+              <a:endParaRPr lang="en-US" sz="700" b="1" dirty="0">
+                <a:solidFill>
+                  <a:schemeClr val="tx1"/>
+                </a:solidFill>
+                <a:latin typeface="Arial" panose="020B0604020202020204" pitchFamily="34" charset="0"/>
+                <a:cs typeface="Arial" panose="020B0604020202020204" pitchFamily="34" charset="0"/>
+              </a:endParaRPr>
+            </a:p>
+          </p:txBody>
+        </p:sp>
+        <p:sp>
+          <p:nvSpPr>
+            <p:cNvPr id="36" name="圆角矩形 35"/>
+            <p:cNvSpPr/>
+            <p:nvPr/>
+          </p:nvSpPr>
+          <p:spPr>
+            <a:xfrm>
+              <a:off x="2423200" y="2708920"/>
+              <a:ext cx="557376" cy="136376"/>
+            </a:xfrm>
+            <a:prstGeom prst="roundRect">
+              <a:avLst/>
+            </a:prstGeom>
+            <a:solidFill>
+              <a:schemeClr val="bg1">
+                <a:lumMod val="85000"/>
+              </a:schemeClr>
+            </a:solidFill>
+            <a:ln w="12700">
+              <a:solidFill>
+                <a:schemeClr val="tx1">
+                  <a:lumMod val="50000"/>
+                  <a:lumOff val="50000"/>
+                </a:schemeClr>
+              </a:solidFill>
+            </a:ln>
+          </p:spPr>
+          <p:style>
+            <a:lnRef idx="2">
+              <a:schemeClr val="accent1">
+                <a:shade val="50000"/>
+              </a:schemeClr>
+            </a:lnRef>
+            <a:fillRef idx="1">
+              <a:schemeClr val="accent1"/>
+            </a:fillRef>
+            <a:effectRef idx="0">
+              <a:schemeClr val="accent1"/>
+            </a:effectRef>
+            <a:fontRef idx="minor">
+              <a:schemeClr val="lt1"/>
+            </a:fontRef>
+          </p:style>
+          <p:txBody>
+            <a:bodyPr lIns="0" tIns="9144" rIns="0" bIns="9144" rtlCol="0" anchor="ctr"/>
+            <a:lstStyle/>
+            <a:p>
+              <a:pPr algn="ctr"/>
+              <a:r>
+                <a:rPr lang="en-US" sz="700" b="1" dirty="0" smtClean="0">
+                  <a:solidFill>
+                    <a:schemeClr val="tx1"/>
+                  </a:solidFill>
+                  <a:latin typeface="Arial" panose="020B0604020202020204" pitchFamily="34" charset="0"/>
+                  <a:cs typeface="Arial" panose="020B0604020202020204" pitchFamily="34" charset="0"/>
+                </a:rPr>
+                <a:t>Rotation</a:t>
+              </a:r>
+              <a:endParaRPr lang="en-US" sz="700" b="1" dirty="0">
+                <a:solidFill>
+                  <a:schemeClr val="tx1"/>
+                </a:solidFill>
+                <a:latin typeface="Arial" panose="020B0604020202020204" pitchFamily="34" charset="0"/>
+                <a:cs typeface="Arial" panose="020B0604020202020204" pitchFamily="34" charset="0"/>
+              </a:endParaRPr>
+            </a:p>
+          </p:txBody>
+        </p:sp>
+        <p:cxnSp>
+          <p:nvCxnSpPr>
+            <p:cNvPr id="8" name="直接箭头连接符 7"/>
+            <p:cNvCxnSpPr>
+              <a:stCxn id="19" idx="2"/>
+              <a:endCxn id="4" idx="0"/>
+            </p:cNvCxnSpPr>
+            <p:nvPr/>
+          </p:nvCxnSpPr>
+          <p:spPr>
+            <a:xfrm>
+              <a:off x="2699792" y="1378868"/>
+              <a:ext cx="0" cy="177924"/>
+            </a:xfrm>
+            <a:prstGeom prst="straightConnector1">
+              <a:avLst/>
+            </a:prstGeom>
+            <a:ln w="15875">
               <a:solidFill>
                 <a:schemeClr val="tx1"/>
               </a:solidFill>
-              <a:latin typeface="Times New Roman" panose="02020603050405020304" pitchFamily="18" charset="0"/>
-              <a:cs typeface="Times New Roman" panose="02020603050405020304" pitchFamily="18" charset="0"/>
-            </a:endParaRPr>
-          </a:p>
-        </p:txBody>
-      </p:sp>
-      <p:cxnSp>
-        <p:nvCxnSpPr>
-          <p:cNvPr id="40" name="直接箭头连接符 39"/>
-          <p:cNvCxnSpPr/>
-          <p:nvPr/>
-        </p:nvCxnSpPr>
-        <p:spPr>
-          <a:xfrm>
-            <a:off x="2973016" y="1191374"/>
-            <a:ext cx="806896" cy="0"/>
-          </a:xfrm>
-          <a:prstGeom prst="straightConnector1">
-            <a:avLst/>
-          </a:prstGeom>
-          <a:ln w="22225">
-            <a:solidFill>
-              <a:schemeClr val="bg1">
-                <a:lumMod val="75000"/>
-              </a:schemeClr>
-            </a:solidFill>
-            <a:tailEnd type="arrow"/>
-          </a:ln>
-        </p:spPr>
-        <p:style>
-          <a:lnRef idx="1">
-            <a:schemeClr val="accent1"/>
-          </a:lnRef>
-          <a:fillRef idx="0">
-            <a:schemeClr val="accent1"/>
-          </a:fillRef>
-          <a:effectRef idx="0">
-            <a:schemeClr val="accent1"/>
-          </a:effectRef>
-          <a:fontRef idx="minor">
-            <a:schemeClr val="tx1"/>
-          </a:fontRef>
-        </p:style>
-      </p:cxnSp>
-      <p:sp>
-        <p:nvSpPr>
-          <p:cNvPr id="13" name="矩形 12"/>
-          <p:cNvSpPr/>
-          <p:nvPr/>
-        </p:nvSpPr>
-        <p:spPr>
-          <a:xfrm>
-            <a:off x="6468591" y="1083406"/>
-            <a:ext cx="1008112" cy="392155"/>
-          </a:xfrm>
-          <a:prstGeom prst="rect">
-            <a:avLst/>
-          </a:prstGeom>
-          <a:solidFill>
-            <a:schemeClr val="bg1">
-              <a:lumMod val="95000"/>
-            </a:schemeClr>
-          </a:solidFill>
-          <a:ln>
-            <a:solidFill>
-              <a:schemeClr val="bg1">
-                <a:lumMod val="85000"/>
-              </a:schemeClr>
-            </a:solidFill>
-          </a:ln>
-        </p:spPr>
-        <p:style>
-          <a:lnRef idx="2">
-            <a:schemeClr val="accent1">
-              <a:shade val="50000"/>
-            </a:schemeClr>
-          </a:lnRef>
-          <a:fillRef idx="1">
-            <a:schemeClr val="accent1"/>
-          </a:fillRef>
-          <a:effectRef idx="0">
-            <a:schemeClr val="accent1"/>
-          </a:effectRef>
-          <a:fontRef idx="minor">
-            <a:schemeClr val="lt1"/>
-          </a:fontRef>
-        </p:style>
-        <p:txBody>
-          <a:bodyPr rtlCol="0" anchor="ctr"/>
-          <a:lstStyle/>
-          <a:p>
-            <a:r>
-              <a:rPr lang="en-US" sz="900" b="1" dirty="0" smtClean="0">
-                <a:solidFill>
-                  <a:schemeClr val="tx1"/>
-                </a:solidFill>
-                <a:latin typeface="Times New Roman" panose="02020603050405020304" pitchFamily="18" charset="0"/>
-                <a:cs typeface="Times New Roman" panose="02020603050405020304" pitchFamily="18" charset="0"/>
-              </a:rPr>
-              <a:t>Systematic review</a:t>
-            </a:r>
-            <a:endParaRPr lang="en-US" sz="900" b="1" dirty="0">
+              <a:tailEnd type="stealth"/>
+            </a:ln>
+          </p:spPr>
+          <p:style>
+            <a:lnRef idx="1">
+              <a:schemeClr val="accent1"/>
+            </a:lnRef>
+            <a:fillRef idx="0">
+              <a:schemeClr val="accent1"/>
+            </a:fillRef>
+            <a:effectRef idx="0">
+              <a:schemeClr val="accent1"/>
+            </a:effectRef>
+            <a:fontRef idx="minor">
+              <a:schemeClr val="tx1"/>
+            </a:fontRef>
+          </p:style>
+        </p:cxnSp>
+        <p:cxnSp>
+          <p:nvCxnSpPr>
+            <p:cNvPr id="10" name="肘形连接符 9"/>
+            <p:cNvCxnSpPr>
+              <a:stCxn id="4" idx="2"/>
+              <a:endCxn id="37" idx="1"/>
+            </p:cNvCxnSpPr>
+            <p:nvPr/>
+          </p:nvCxnSpPr>
+          <p:spPr>
+            <a:xfrm rot="10800000" flipV="1">
+              <a:off x="1907706" y="2276872"/>
+              <a:ext cx="72007" cy="1008112"/>
+            </a:xfrm>
+            <a:prstGeom prst="bentConnector3">
+              <a:avLst>
+                <a:gd name="adj1" fmla="val 576204"/>
+              </a:avLst>
+            </a:prstGeom>
+            <a:ln w="15875">
               <a:solidFill>
                 <a:schemeClr val="tx1"/>
               </a:solidFill>
-              <a:latin typeface="Times New Roman" panose="02020603050405020304" pitchFamily="18" charset="0"/>
-              <a:cs typeface="Times New Roman" panose="02020603050405020304" pitchFamily="18" charset="0"/>
-            </a:endParaRPr>
-          </a:p>
-        </p:txBody>
-      </p:sp>
-      <p:sp>
-        <p:nvSpPr>
-          <p:cNvPr id="14" name="矩形 13"/>
-          <p:cNvSpPr/>
-          <p:nvPr/>
-        </p:nvSpPr>
-        <p:spPr>
-          <a:xfrm>
-            <a:off x="6468591" y="1902693"/>
-            <a:ext cx="1008112" cy="392155"/>
-          </a:xfrm>
-          <a:prstGeom prst="rect">
-            <a:avLst/>
-          </a:prstGeom>
-          <a:solidFill>
-            <a:schemeClr val="bg1">
-              <a:lumMod val="95000"/>
-            </a:schemeClr>
-          </a:solidFill>
-          <a:ln>
+              <a:tailEnd type="stealth"/>
+            </a:ln>
+          </p:spPr>
+          <p:style>
+            <a:lnRef idx="1">
+              <a:schemeClr val="accent1"/>
+            </a:lnRef>
+            <a:fillRef idx="0">
+              <a:schemeClr val="accent1"/>
+            </a:fillRef>
+            <a:effectRef idx="0">
+              <a:schemeClr val="accent1"/>
+            </a:effectRef>
+            <a:fontRef idx="minor">
+              <a:schemeClr val="tx1"/>
+            </a:fontRef>
+          </p:style>
+        </p:cxnSp>
+        <p:sp>
+          <p:nvSpPr>
+            <p:cNvPr id="37" name="矩形 36"/>
+            <p:cNvSpPr/>
+            <p:nvPr/>
+          </p:nvSpPr>
+          <p:spPr>
+            <a:xfrm>
+              <a:off x="1907705" y="3140968"/>
+              <a:ext cx="1584176" cy="288032"/>
+            </a:xfrm>
+            <a:prstGeom prst="rect">
+              <a:avLst/>
+            </a:prstGeom>
             <a:solidFill>
               <a:schemeClr val="bg1">
-                <a:lumMod val="85000"/>
+                <a:lumMod val="95000"/>
               </a:schemeClr>
             </a:solidFill>
-          </a:ln>
-        </p:spPr>
-        <p:style>
-          <a:lnRef idx="2">
-            <a:schemeClr val="accent1">
-              <a:shade val="50000"/>
-            </a:schemeClr>
-          </a:lnRef>
-          <a:fillRef idx="1">
-            <a:schemeClr val="accent1"/>
-          </a:fillRef>
-          <a:effectRef idx="0">
-            <a:schemeClr val="accent1"/>
-          </a:effectRef>
-          <a:fontRef idx="minor">
-            <a:schemeClr val="lt1"/>
-          </a:fontRef>
-        </p:style>
-        <p:txBody>
-          <a:bodyPr rtlCol="0" anchor="ctr"/>
-          <a:lstStyle/>
-          <a:p>
-            <a:r>
-              <a:rPr lang="en-US" sz="900" b="1" dirty="0" smtClean="0">
+            <a:ln>
+              <a:solidFill>
+                <a:schemeClr val="bg1">
+                  <a:lumMod val="85000"/>
+                </a:schemeClr>
+              </a:solidFill>
+            </a:ln>
+          </p:spPr>
+          <p:style>
+            <a:lnRef idx="2">
+              <a:schemeClr val="accent1">
+                <a:shade val="50000"/>
+              </a:schemeClr>
+            </a:lnRef>
+            <a:fillRef idx="1">
+              <a:schemeClr val="accent1"/>
+            </a:fillRef>
+            <a:effectRef idx="0">
+              <a:schemeClr val="accent1"/>
+            </a:effectRef>
+            <a:fontRef idx="minor">
+              <a:schemeClr val="lt1"/>
+            </a:fontRef>
+          </p:style>
+          <p:txBody>
+            <a:bodyPr lIns="45720" rIns="45720" rtlCol="0" anchor="ctr"/>
+            <a:lstStyle/>
+            <a:p>
+              <a:pPr algn="ctr"/>
+              <a:r>
+                <a:rPr lang="en-US" sz="800" b="1" dirty="0" smtClean="0">
+                  <a:solidFill>
+                    <a:schemeClr val="tx1"/>
+                  </a:solidFill>
+                  <a:latin typeface="Arial" panose="020B0604020202020204" pitchFamily="34" charset="0"/>
+                  <a:cs typeface="Arial" panose="020B0604020202020204" pitchFamily="34" charset="0"/>
+                </a:rPr>
+                <a:t>Pairwise comparison between control and treatment  </a:t>
+              </a:r>
+              <a:endParaRPr lang="en-US" sz="800" b="1" dirty="0">
                 <a:solidFill>
                   <a:schemeClr val="tx1"/>
                 </a:solidFill>
-                <a:latin typeface="Times New Roman" panose="02020603050405020304" pitchFamily="18" charset="0"/>
-                <a:cs typeface="Times New Roman" panose="02020603050405020304" pitchFamily="18" charset="0"/>
-              </a:rPr>
-              <a:t>Meta-analysis</a:t>
-            </a:r>
-            <a:endParaRPr lang="en-US" sz="900" b="1" dirty="0">
+                <a:latin typeface="Arial" panose="020B0604020202020204" pitchFamily="34" charset="0"/>
+                <a:cs typeface="Arial" panose="020B0604020202020204" pitchFamily="34" charset="0"/>
+              </a:endParaRPr>
+            </a:p>
+          </p:txBody>
+        </p:sp>
+        <p:sp>
+          <p:nvSpPr>
+            <p:cNvPr id="55" name="TextBox 54"/>
+            <p:cNvSpPr txBox="1"/>
+            <p:nvPr/>
+          </p:nvSpPr>
+          <p:spPr>
+            <a:xfrm>
+              <a:off x="1455209" y="2019320"/>
+              <a:ext cx="492443" cy="230832"/>
+            </a:xfrm>
+            <a:prstGeom prst="rect">
+              <a:avLst/>
+            </a:prstGeom>
+            <a:noFill/>
+          </p:spPr>
+          <p:txBody>
+            <a:bodyPr wrap="none" rtlCol="0">
+              <a:spAutoFit/>
+            </a:bodyPr>
+            <a:lstStyle/>
+            <a:p>
+              <a:r>
+                <a:rPr lang="en-US" sz="900" b="1" dirty="0" smtClean="0">
+                  <a:latin typeface="Arial" panose="020B0604020202020204" pitchFamily="34" charset="0"/>
+                  <a:cs typeface="Arial" panose="020B0604020202020204" pitchFamily="34" charset="0"/>
+                </a:rPr>
+                <a:t>Same</a:t>
+              </a:r>
+              <a:endParaRPr lang="en-US" sz="900" b="1" dirty="0">
+                <a:latin typeface="Arial" panose="020B0604020202020204" pitchFamily="34" charset="0"/>
+                <a:cs typeface="Arial" panose="020B0604020202020204" pitchFamily="34" charset="0"/>
+              </a:endParaRPr>
+            </a:p>
+          </p:txBody>
+        </p:sp>
+        <p:cxnSp>
+          <p:nvCxnSpPr>
+            <p:cNvPr id="56" name="肘形连接符 55"/>
+            <p:cNvCxnSpPr>
+              <a:stCxn id="4" idx="6"/>
+              <a:endCxn id="37" idx="3"/>
+            </p:cNvCxnSpPr>
+            <p:nvPr/>
+          </p:nvCxnSpPr>
+          <p:spPr>
+            <a:xfrm>
+              <a:off x="3419872" y="2276872"/>
+              <a:ext cx="72009" cy="1008112"/>
+            </a:xfrm>
+            <a:prstGeom prst="bentConnector3">
+              <a:avLst>
+                <a:gd name="adj1" fmla="val 671429"/>
+              </a:avLst>
+            </a:prstGeom>
+            <a:ln w="15875">
               <a:solidFill>
                 <a:schemeClr val="tx1"/>
               </a:solidFill>
-              <a:latin typeface="Times New Roman" panose="02020603050405020304" pitchFamily="18" charset="0"/>
-              <a:cs typeface="Times New Roman" panose="02020603050405020304" pitchFamily="18" charset="0"/>
-            </a:endParaRPr>
-          </a:p>
-        </p:txBody>
-      </p:sp>
-      <p:sp>
-        <p:nvSpPr>
-          <p:cNvPr id="15" name="矩形 14"/>
-          <p:cNvSpPr/>
-          <p:nvPr/>
-        </p:nvSpPr>
-        <p:spPr>
-          <a:xfrm>
-            <a:off x="6468591" y="2699697"/>
-            <a:ext cx="1008112" cy="392155"/>
-          </a:xfrm>
-          <a:prstGeom prst="rect">
-            <a:avLst/>
-          </a:prstGeom>
-          <a:solidFill>
-            <a:schemeClr val="bg1">
-              <a:lumMod val="95000"/>
-            </a:schemeClr>
-          </a:solidFill>
-          <a:ln>
-            <a:solidFill>
-              <a:schemeClr val="bg1">
-                <a:lumMod val="85000"/>
-              </a:schemeClr>
-            </a:solidFill>
-          </a:ln>
-        </p:spPr>
-        <p:style>
-          <a:lnRef idx="2">
-            <a:schemeClr val="accent1">
-              <a:shade val="50000"/>
-            </a:schemeClr>
-          </a:lnRef>
-          <a:fillRef idx="1">
-            <a:schemeClr val="accent1"/>
-          </a:fillRef>
-          <a:effectRef idx="0">
-            <a:schemeClr val="accent1"/>
-          </a:effectRef>
-          <a:fontRef idx="minor">
-            <a:schemeClr val="lt1"/>
-          </a:fontRef>
-        </p:style>
-        <p:txBody>
-          <a:bodyPr rtlCol="0" anchor="ctr"/>
-          <a:lstStyle/>
-          <a:p>
-            <a:r>
-              <a:rPr lang="en-US" sz="900" b="1" dirty="0" smtClean="0">
-                <a:solidFill>
-                  <a:schemeClr val="tx1"/>
-                </a:solidFill>
-                <a:latin typeface="Times New Roman" panose="02020603050405020304" pitchFamily="18" charset="0"/>
-                <a:cs typeface="Times New Roman" panose="02020603050405020304" pitchFamily="18" charset="0"/>
-              </a:rPr>
-              <a:t>Soil health calculator</a:t>
-            </a:r>
-            <a:endParaRPr lang="en-US" sz="900" b="1" dirty="0">
-              <a:solidFill>
-                <a:schemeClr val="tx1"/>
-              </a:solidFill>
-              <a:latin typeface="Times New Roman" panose="02020603050405020304" pitchFamily="18" charset="0"/>
-              <a:cs typeface="Times New Roman" panose="02020603050405020304" pitchFamily="18" charset="0"/>
-            </a:endParaRPr>
-          </a:p>
-        </p:txBody>
-      </p:sp>
-      <p:sp>
-        <p:nvSpPr>
-          <p:cNvPr id="16" name="矩形 15"/>
-          <p:cNvSpPr/>
-          <p:nvPr/>
-        </p:nvSpPr>
-        <p:spPr>
-          <a:xfrm>
-            <a:off x="6467847" y="3491785"/>
-            <a:ext cx="1008112" cy="392155"/>
-          </a:xfrm>
-          <a:prstGeom prst="rect">
-            <a:avLst/>
-          </a:prstGeom>
-          <a:solidFill>
-            <a:schemeClr val="bg1">
-              <a:lumMod val="95000"/>
-            </a:schemeClr>
-          </a:solidFill>
-          <a:ln>
-            <a:solidFill>
-              <a:schemeClr val="bg1">
-                <a:lumMod val="85000"/>
-              </a:schemeClr>
-            </a:solidFill>
-          </a:ln>
-        </p:spPr>
-        <p:style>
-          <a:lnRef idx="2">
-            <a:schemeClr val="accent1">
-              <a:shade val="50000"/>
-            </a:schemeClr>
-          </a:lnRef>
-          <a:fillRef idx="1">
-            <a:schemeClr val="accent1"/>
-          </a:fillRef>
-          <a:effectRef idx="0">
-            <a:schemeClr val="accent1"/>
-          </a:effectRef>
-          <a:fontRef idx="minor">
-            <a:schemeClr val="lt1"/>
-          </a:fontRef>
-        </p:style>
-        <p:txBody>
-          <a:bodyPr rtlCol="0" anchor="ctr"/>
-          <a:lstStyle/>
-          <a:p>
-            <a:r>
-              <a:rPr lang="en-US" sz="900" b="1" dirty="0" smtClean="0">
-                <a:solidFill>
-                  <a:schemeClr val="tx1"/>
-                </a:solidFill>
-                <a:latin typeface="Times New Roman" panose="02020603050405020304" pitchFamily="18" charset="0"/>
-                <a:cs typeface="Times New Roman" panose="02020603050405020304" pitchFamily="18" charset="0"/>
-              </a:rPr>
-              <a:t>Experiment protocol</a:t>
-            </a:r>
-            <a:endParaRPr lang="en-US" sz="900" b="1" dirty="0">
-              <a:solidFill>
-                <a:schemeClr val="tx1"/>
-              </a:solidFill>
-              <a:latin typeface="Times New Roman" panose="02020603050405020304" pitchFamily="18" charset="0"/>
-              <a:cs typeface="Times New Roman" panose="02020603050405020304" pitchFamily="18" charset="0"/>
-            </a:endParaRPr>
-          </a:p>
-        </p:txBody>
-      </p:sp>
-      <p:sp>
-        <p:nvSpPr>
-          <p:cNvPr id="17" name="矩形 16"/>
-          <p:cNvSpPr/>
-          <p:nvPr/>
-        </p:nvSpPr>
-        <p:spPr>
-          <a:xfrm>
-            <a:off x="6372200" y="913269"/>
-            <a:ext cx="1224136" cy="3163803"/>
-          </a:xfrm>
-          <a:prstGeom prst="rect">
-            <a:avLst/>
-          </a:prstGeom>
-          <a:noFill/>
-          <a:ln>
-            <a:solidFill>
-              <a:schemeClr val="bg1">
-                <a:lumMod val="85000"/>
-              </a:schemeClr>
-            </a:solidFill>
-          </a:ln>
-        </p:spPr>
-        <p:style>
-          <a:lnRef idx="2">
-            <a:schemeClr val="accent1">
-              <a:shade val="50000"/>
-            </a:schemeClr>
-          </a:lnRef>
-          <a:fillRef idx="1">
-            <a:schemeClr val="accent1"/>
-          </a:fillRef>
-          <a:effectRef idx="0">
-            <a:schemeClr val="accent1"/>
-          </a:effectRef>
-          <a:fontRef idx="minor">
-            <a:schemeClr val="lt1"/>
-          </a:fontRef>
-        </p:style>
-        <p:txBody>
-          <a:bodyPr rtlCol="0" anchor="ctr"/>
-          <a:lstStyle/>
-          <a:p>
-            <a:endParaRPr lang="en-US" sz="900" b="1" dirty="0">
-              <a:solidFill>
-                <a:schemeClr val="tx1"/>
-              </a:solidFill>
-              <a:latin typeface="Times New Roman" panose="02020603050405020304" pitchFamily="18" charset="0"/>
-              <a:cs typeface="Times New Roman" panose="02020603050405020304" pitchFamily="18" charset="0"/>
-            </a:endParaRPr>
-          </a:p>
-        </p:txBody>
-      </p:sp>
-      <p:cxnSp>
-        <p:nvCxnSpPr>
-          <p:cNvPr id="21" name="直接箭头连接符 20"/>
-          <p:cNvCxnSpPr/>
-          <p:nvPr/>
-        </p:nvCxnSpPr>
-        <p:spPr>
-          <a:xfrm>
-            <a:off x="5483721" y="1191374"/>
-            <a:ext cx="888479" cy="0"/>
-          </a:xfrm>
-          <a:prstGeom prst="straightConnector1">
-            <a:avLst/>
-          </a:prstGeom>
-          <a:ln w="22225">
-            <a:solidFill>
-              <a:schemeClr val="bg1">
-                <a:lumMod val="75000"/>
-              </a:schemeClr>
-            </a:solidFill>
-            <a:tailEnd type="arrow"/>
-          </a:ln>
-        </p:spPr>
-        <p:style>
-          <a:lnRef idx="1">
-            <a:schemeClr val="accent1"/>
-          </a:lnRef>
-          <a:fillRef idx="0">
-            <a:schemeClr val="accent1"/>
-          </a:fillRef>
-          <a:effectRef idx="0">
-            <a:schemeClr val="accent1"/>
-          </a:effectRef>
-          <a:fontRef idx="minor">
-            <a:schemeClr val="tx1"/>
-          </a:fontRef>
-        </p:style>
-      </p:cxnSp>
-      <p:sp>
-        <p:nvSpPr>
-          <p:cNvPr id="27" name="矩形 26"/>
-          <p:cNvSpPr/>
-          <p:nvPr/>
-        </p:nvSpPr>
-        <p:spPr>
-          <a:xfrm>
-            <a:off x="1845254" y="3495691"/>
-            <a:ext cx="1008112" cy="392155"/>
-          </a:xfrm>
-          <a:prstGeom prst="rect">
-            <a:avLst/>
-          </a:prstGeom>
-          <a:solidFill>
-            <a:schemeClr val="bg1">
-              <a:lumMod val="95000"/>
-            </a:schemeClr>
-          </a:solidFill>
-          <a:ln>
-            <a:solidFill>
-              <a:schemeClr val="bg1">
-                <a:lumMod val="85000"/>
-              </a:schemeClr>
-            </a:solidFill>
-          </a:ln>
-        </p:spPr>
-        <p:style>
-          <a:lnRef idx="2">
-            <a:schemeClr val="accent1">
-              <a:shade val="50000"/>
-            </a:schemeClr>
-          </a:lnRef>
-          <a:fillRef idx="1">
-            <a:schemeClr val="accent1"/>
-          </a:fillRef>
-          <a:effectRef idx="0">
-            <a:schemeClr val="accent1"/>
-          </a:effectRef>
-          <a:fontRef idx="minor">
-            <a:schemeClr val="lt1"/>
-          </a:fontRef>
-        </p:style>
-        <p:txBody>
-          <a:bodyPr rtlCol="0" anchor="ctr"/>
-          <a:lstStyle/>
-          <a:p>
-            <a:r>
-              <a:rPr lang="en-US" sz="900" b="1" dirty="0" smtClean="0">
-                <a:solidFill>
-                  <a:schemeClr val="tx1"/>
-                </a:solidFill>
-                <a:latin typeface="Times New Roman" panose="02020603050405020304" pitchFamily="18" charset="0"/>
-                <a:cs typeface="Times New Roman" panose="02020603050405020304" pitchFamily="18" charset="0"/>
-              </a:rPr>
-              <a:t>Paper collection and selection</a:t>
-            </a:r>
-            <a:endParaRPr lang="en-US" sz="900" b="1" dirty="0">
-              <a:solidFill>
-                <a:schemeClr val="tx1"/>
-              </a:solidFill>
-              <a:latin typeface="Times New Roman" panose="02020603050405020304" pitchFamily="18" charset="0"/>
-              <a:cs typeface="Times New Roman" panose="02020603050405020304" pitchFamily="18" charset="0"/>
-            </a:endParaRPr>
-          </a:p>
-        </p:txBody>
-      </p:sp>
-      <p:sp>
-        <p:nvSpPr>
-          <p:cNvPr id="28" name="矩形 27"/>
-          <p:cNvSpPr/>
-          <p:nvPr/>
-        </p:nvSpPr>
-        <p:spPr>
-          <a:xfrm>
-            <a:off x="1851286" y="1902051"/>
-            <a:ext cx="1008112" cy="392155"/>
-          </a:xfrm>
-          <a:prstGeom prst="rect">
-            <a:avLst/>
-          </a:prstGeom>
-          <a:solidFill>
-            <a:schemeClr val="bg1">
-              <a:lumMod val="95000"/>
-            </a:schemeClr>
-          </a:solidFill>
-          <a:ln>
-            <a:solidFill>
-              <a:schemeClr val="bg1">
-                <a:lumMod val="85000"/>
-              </a:schemeClr>
-            </a:solidFill>
-          </a:ln>
-        </p:spPr>
-        <p:style>
-          <a:lnRef idx="2">
-            <a:schemeClr val="accent1">
-              <a:shade val="50000"/>
-            </a:schemeClr>
-          </a:lnRef>
-          <a:fillRef idx="1">
-            <a:schemeClr val="accent1"/>
-          </a:fillRef>
-          <a:effectRef idx="0">
-            <a:schemeClr val="accent1"/>
-          </a:effectRef>
-          <a:fontRef idx="minor">
-            <a:schemeClr val="lt1"/>
-          </a:fontRef>
-        </p:style>
-        <p:txBody>
-          <a:bodyPr rtlCol="0" anchor="ctr"/>
-          <a:lstStyle/>
-          <a:p>
-            <a:r>
-              <a:rPr lang="en-US" sz="900" b="1" dirty="0" smtClean="0">
-                <a:solidFill>
-                  <a:schemeClr val="tx1"/>
-                </a:solidFill>
-                <a:latin typeface="Times New Roman" panose="02020603050405020304" pitchFamily="18" charset="0"/>
-                <a:cs typeface="Times New Roman" panose="02020603050405020304" pitchFamily="18" charset="0"/>
-              </a:rPr>
-              <a:t>Quality control</a:t>
-            </a:r>
-            <a:endParaRPr lang="en-US" sz="900" b="1" dirty="0">
-              <a:solidFill>
-                <a:schemeClr val="tx1"/>
-              </a:solidFill>
-              <a:latin typeface="Times New Roman" panose="02020603050405020304" pitchFamily="18" charset="0"/>
-              <a:cs typeface="Times New Roman" panose="02020603050405020304" pitchFamily="18" charset="0"/>
-            </a:endParaRPr>
-          </a:p>
-        </p:txBody>
-      </p:sp>
-      <p:sp>
-        <p:nvSpPr>
-          <p:cNvPr id="34" name="矩形 33"/>
-          <p:cNvSpPr/>
-          <p:nvPr/>
-        </p:nvSpPr>
-        <p:spPr>
-          <a:xfrm>
-            <a:off x="1851286" y="2699055"/>
-            <a:ext cx="1008112" cy="392155"/>
-          </a:xfrm>
-          <a:prstGeom prst="rect">
-            <a:avLst/>
-          </a:prstGeom>
-          <a:solidFill>
-            <a:schemeClr val="bg1">
-              <a:lumMod val="95000"/>
-            </a:schemeClr>
-          </a:solidFill>
-          <a:ln>
-            <a:solidFill>
-              <a:schemeClr val="bg1">
-                <a:lumMod val="85000"/>
-              </a:schemeClr>
-            </a:solidFill>
-          </a:ln>
-        </p:spPr>
-        <p:style>
-          <a:lnRef idx="2">
-            <a:schemeClr val="accent1">
-              <a:shade val="50000"/>
-            </a:schemeClr>
-          </a:lnRef>
-          <a:fillRef idx="1">
-            <a:schemeClr val="accent1"/>
-          </a:fillRef>
-          <a:effectRef idx="0">
-            <a:schemeClr val="accent1"/>
-          </a:effectRef>
-          <a:fontRef idx="minor">
-            <a:schemeClr val="lt1"/>
-          </a:fontRef>
-        </p:style>
-        <p:txBody>
-          <a:bodyPr rtlCol="0" anchor="ctr"/>
-          <a:lstStyle/>
-          <a:p>
-            <a:r>
-              <a:rPr lang="en-US" sz="900" b="1" dirty="0">
-                <a:solidFill>
-                  <a:schemeClr val="tx1"/>
-                </a:solidFill>
-                <a:latin typeface="Times New Roman" panose="02020603050405020304" pitchFamily="18" charset="0"/>
-                <a:cs typeface="Times New Roman" panose="02020603050405020304" pitchFamily="18" charset="0"/>
-              </a:rPr>
-              <a:t>Digitization and data integration</a:t>
-            </a:r>
-          </a:p>
-        </p:txBody>
-      </p:sp>
-      <p:sp>
-        <p:nvSpPr>
-          <p:cNvPr id="35" name="矩形 34"/>
-          <p:cNvSpPr/>
-          <p:nvPr/>
-        </p:nvSpPr>
-        <p:spPr>
-          <a:xfrm>
-            <a:off x="1850542" y="1087312"/>
-            <a:ext cx="1008112" cy="392155"/>
-          </a:xfrm>
-          <a:prstGeom prst="rect">
-            <a:avLst/>
-          </a:prstGeom>
-          <a:solidFill>
-            <a:schemeClr val="bg1">
-              <a:lumMod val="95000"/>
-            </a:schemeClr>
-          </a:solidFill>
-          <a:ln>
-            <a:solidFill>
-              <a:schemeClr val="bg1">
-                <a:lumMod val="85000"/>
-              </a:schemeClr>
-            </a:solidFill>
-          </a:ln>
-        </p:spPr>
-        <p:style>
-          <a:lnRef idx="2">
-            <a:schemeClr val="accent1">
-              <a:shade val="50000"/>
-            </a:schemeClr>
-          </a:lnRef>
-          <a:fillRef idx="1">
-            <a:schemeClr val="accent1"/>
-          </a:fillRef>
-          <a:effectRef idx="0">
-            <a:schemeClr val="accent1"/>
-          </a:effectRef>
-          <a:fontRef idx="minor">
-            <a:schemeClr val="lt1"/>
-          </a:fontRef>
-        </p:style>
-        <p:txBody>
-          <a:bodyPr rtlCol="0" anchor="ctr"/>
-          <a:lstStyle/>
-          <a:p>
-            <a:r>
-              <a:rPr lang="en-US" sz="900" b="1" dirty="0" smtClean="0">
-                <a:solidFill>
-                  <a:schemeClr val="tx1"/>
-                </a:solidFill>
-                <a:latin typeface="Times New Roman" panose="02020603050405020304" pitchFamily="18" charset="0"/>
-                <a:cs typeface="Times New Roman" panose="02020603050405020304" pitchFamily="18" charset="0"/>
-              </a:rPr>
-              <a:t>Data processing</a:t>
-            </a:r>
-            <a:endParaRPr lang="en-US" sz="900" b="1" dirty="0">
-              <a:solidFill>
-                <a:schemeClr val="tx1"/>
-              </a:solidFill>
-              <a:latin typeface="Times New Roman" panose="02020603050405020304" pitchFamily="18" charset="0"/>
-              <a:cs typeface="Times New Roman" panose="02020603050405020304" pitchFamily="18" charset="0"/>
-            </a:endParaRPr>
-          </a:p>
-        </p:txBody>
-      </p:sp>
-      <p:cxnSp>
-        <p:nvCxnSpPr>
-          <p:cNvPr id="41" name="直接箭头连接符 40"/>
-          <p:cNvCxnSpPr>
-            <a:stCxn id="34" idx="0"/>
-            <a:endCxn id="28" idx="2"/>
-          </p:cNvCxnSpPr>
-          <p:nvPr/>
-        </p:nvCxnSpPr>
-        <p:spPr>
-          <a:xfrm flipV="1">
-            <a:off x="2355342" y="2294206"/>
-            <a:ext cx="0" cy="404849"/>
-          </a:xfrm>
-          <a:prstGeom prst="straightConnector1">
-            <a:avLst/>
-          </a:prstGeom>
-          <a:ln w="22225">
-            <a:solidFill>
-              <a:schemeClr val="bg1">
-                <a:lumMod val="75000"/>
-              </a:schemeClr>
-            </a:solidFill>
-            <a:tailEnd type="arrow"/>
-          </a:ln>
-        </p:spPr>
-        <p:style>
-          <a:lnRef idx="1">
-            <a:schemeClr val="accent1"/>
-          </a:lnRef>
-          <a:fillRef idx="0">
-            <a:schemeClr val="accent1"/>
-          </a:fillRef>
-          <a:effectRef idx="0">
-            <a:schemeClr val="accent1"/>
-          </a:effectRef>
-          <a:fontRef idx="minor">
-            <a:schemeClr val="tx1"/>
-          </a:fontRef>
-        </p:style>
-      </p:cxnSp>
-      <p:cxnSp>
-        <p:nvCxnSpPr>
-          <p:cNvPr id="42" name="直接箭头连接符 41"/>
-          <p:cNvCxnSpPr>
-            <a:stCxn id="27" idx="0"/>
-            <a:endCxn id="34" idx="2"/>
-          </p:cNvCxnSpPr>
-          <p:nvPr/>
-        </p:nvCxnSpPr>
-        <p:spPr>
-          <a:xfrm flipV="1">
-            <a:off x="2349310" y="3091210"/>
-            <a:ext cx="6032" cy="404481"/>
-          </a:xfrm>
-          <a:prstGeom prst="straightConnector1">
-            <a:avLst/>
-          </a:prstGeom>
-          <a:ln w="22225">
-            <a:solidFill>
-              <a:schemeClr val="bg1">
-                <a:lumMod val="75000"/>
-              </a:schemeClr>
-            </a:solidFill>
-            <a:tailEnd type="arrow"/>
-          </a:ln>
-        </p:spPr>
-        <p:style>
-          <a:lnRef idx="1">
-            <a:schemeClr val="accent1"/>
-          </a:lnRef>
-          <a:fillRef idx="0">
-            <a:schemeClr val="accent1"/>
-          </a:fillRef>
-          <a:effectRef idx="0">
-            <a:schemeClr val="accent1"/>
-          </a:effectRef>
-          <a:fontRef idx="minor">
-            <a:schemeClr val="tx1"/>
-          </a:fontRef>
-        </p:style>
-      </p:cxnSp>
-      <p:cxnSp>
-        <p:nvCxnSpPr>
-          <p:cNvPr id="43" name="直接箭头连接符 42"/>
-          <p:cNvCxnSpPr/>
-          <p:nvPr/>
-        </p:nvCxnSpPr>
-        <p:spPr>
-          <a:xfrm flipV="1">
-            <a:off x="2346185" y="1490609"/>
-            <a:ext cx="0" cy="404849"/>
-          </a:xfrm>
-          <a:prstGeom prst="straightConnector1">
-            <a:avLst/>
-          </a:prstGeom>
-          <a:ln w="22225">
-            <a:solidFill>
-              <a:schemeClr val="bg1">
-                <a:lumMod val="75000"/>
-              </a:schemeClr>
-            </a:solidFill>
-            <a:tailEnd type="arrow"/>
-          </a:ln>
-        </p:spPr>
-        <p:style>
-          <a:lnRef idx="1">
-            <a:schemeClr val="accent1"/>
-          </a:lnRef>
-          <a:fillRef idx="0">
-            <a:schemeClr val="accent1"/>
-          </a:fillRef>
-          <a:effectRef idx="0">
-            <a:schemeClr val="accent1"/>
-          </a:effectRef>
-          <a:fontRef idx="minor">
-            <a:schemeClr val="tx1"/>
-          </a:fontRef>
-        </p:style>
-      </p:cxnSp>
-      <p:pic>
-        <p:nvPicPr>
-          <p:cNvPr id="2" name="Picture 2" descr="G:\My Drive\MyResearch\29. PstDoc\NRCS\Manuscript_ScientificData\DataAndR\jinshi_600.png"/>
-          <p:cNvPicPr>
-            <a:picLocks noChangeAspect="1" noChangeArrowheads="1"/>
-          </p:cNvPicPr>
-          <p:nvPr/>
-        </p:nvPicPr>
-        <p:blipFill>
-          <a:blip r:embed="rId2" cstate="print">
-            <a:extLst>
-              <a:ext uri="{28A0092B-C50C-407E-A947-70E740481C1C}">
-                <a14:useLocalDpi xmlns:a14="http://schemas.microsoft.com/office/drawing/2010/main" val="0"/>
-              </a:ext>
-            </a:extLst>
-          </a:blip>
-          <a:srcRect/>
-          <a:stretch>
-            <a:fillRect/>
-          </a:stretch>
-        </p:blipFill>
-        <p:spPr bwMode="auto">
-          <a:xfrm>
-            <a:off x="3417255" y="1041264"/>
-            <a:ext cx="2503187" cy="3035808"/>
-          </a:xfrm>
-          <a:prstGeom prst="rect">
-            <a:avLst/>
-          </a:prstGeom>
-          <a:noFill/>
-          <a:extLst>
-            <a:ext uri="{909E8E84-426E-40DD-AFC4-6F175D3DCCD1}">
-              <a14:hiddenFill xmlns:a14="http://schemas.microsoft.com/office/drawing/2010/main">
-                <a:solidFill>
-                  <a:srgbClr val="FFFFFF"/>
-                </a:solidFill>
-              </a14:hiddenFill>
-            </a:ext>
-          </a:extLst>
-        </p:spPr>
-      </p:pic>
+              <a:tailEnd type="stealth"/>
+            </a:ln>
+          </p:spPr>
+          <p:style>
+            <a:lnRef idx="1">
+              <a:schemeClr val="accent1"/>
+            </a:lnRef>
+            <a:fillRef idx="0">
+              <a:schemeClr val="accent1"/>
+            </a:fillRef>
+            <a:effectRef idx="0">
+              <a:schemeClr val="accent1"/>
+            </a:effectRef>
+            <a:fontRef idx="minor">
+              <a:schemeClr val="tx1"/>
+            </a:fontRef>
+          </p:style>
+        </p:cxnSp>
+        <p:sp>
+          <p:nvSpPr>
+            <p:cNvPr id="57" name="TextBox 56"/>
+            <p:cNvSpPr txBox="1"/>
+            <p:nvPr/>
+          </p:nvSpPr>
+          <p:spPr>
+            <a:xfrm>
+              <a:off x="3347864" y="2019320"/>
+              <a:ext cx="659155" cy="230832"/>
+            </a:xfrm>
+            <a:prstGeom prst="rect">
+              <a:avLst/>
+            </a:prstGeom>
+            <a:noFill/>
+          </p:spPr>
+          <p:txBody>
+            <a:bodyPr wrap="none" rtlCol="0">
+              <a:spAutoFit/>
+            </a:bodyPr>
+            <a:lstStyle/>
+            <a:p>
+              <a:r>
+                <a:rPr lang="en-US" sz="900" b="1" dirty="0" smtClean="0">
+                  <a:latin typeface="Arial" panose="020B0604020202020204" pitchFamily="34" charset="0"/>
+                  <a:cs typeface="Arial" panose="020B0604020202020204" pitchFamily="34" charset="0"/>
+                </a:rPr>
+                <a:t>Different</a:t>
+              </a:r>
+              <a:endParaRPr lang="en-US" sz="900" b="1" dirty="0">
+                <a:latin typeface="Arial" panose="020B0604020202020204" pitchFamily="34" charset="0"/>
+                <a:cs typeface="Arial" panose="020B0604020202020204" pitchFamily="34" charset="0"/>
+              </a:endParaRPr>
+            </a:p>
+          </p:txBody>
+        </p:sp>
+      </p:grpSp>
     </p:spTree>
     <p:extLst>
       <p:ext uri="{BB962C8B-B14F-4D97-AF65-F5344CB8AC3E}">
-        <p14:creationId xmlns:p14="http://schemas.microsoft.com/office/powerpoint/2010/main" val="2674692492"/>
+        <p14:creationId xmlns:p14="http://schemas.microsoft.com/office/powerpoint/2010/main" val="3315842641"/>
       </p:ext>
     </p:extLst>
   </p:cSld>
@@ -5724,7 +8072,7 @@
 </p:sld>
 </file>
 
-<file path=ppt/slides/slide3.xml><?xml version="1.0" encoding="utf-8"?>
+<file path=ppt/slides/slide4.xml><?xml version="1.0" encoding="utf-8"?>
 <p:sld xmlns:a="http://schemas.openxmlformats.org/drawingml/2006/main" xmlns:r="http://schemas.openxmlformats.org/officeDocument/2006/relationships" xmlns:p="http://schemas.openxmlformats.org/presentationml/2006/main">
   <p:cSld>
     <p:spTree>

</xml_diff>